<commit_message>
Añadidos cambios a la presentacion
</commit_message>
<xml_diff>
--- a/Practicas/Practica 1 - Implementacion CAFE/documentation/Presentacion DSL + Cafe.pptx
+++ b/Practicas/Practica 1 - Implementacion CAFE/documentation/Presentacion DSL + Cafe.pptx
@@ -7721,7 +7721,7 @@
             <a:pPr rtl="0"/>
             <a:fld id="{C62B80FE-187A-4085-BD71-F0873FF7BD68}" type="datetime1">
               <a:rPr lang="es-ES" smtClean="0"/>
-              <a:t>01/12/2023</a:t>
+              <a:t>03/12/2023</a:t>
             </a:fld>
             <a:endParaRPr lang="es-ES"/>
           </a:p>
@@ -7903,7 +7903,7 @@
             <a:pPr rtl="0"/>
             <a:fld id="{6D59A2BD-4571-4110-BB3E-5D004DE434FA}" type="datetime1">
               <a:rPr lang="es-ES" noProof="0" smtClean="0"/>
-              <a:t>01/12/2023</a:t>
+              <a:t>03/12/2023</a:t>
             </a:fld>
             <a:endParaRPr lang="es-ES" noProof="0"/>
           </a:p>
@@ -8678,7 +8678,7 @@
             <a:pPr rtl="0"/>
             <a:fld id="{F409C0D2-15DE-4FAC-845B-C48979FFAEB9}" type="datetime1">
               <a:rPr lang="es-ES" noProof="0" smtClean="0"/>
-              <a:t>01/12/2023</a:t>
+              <a:t>03/12/2023</a:t>
             </a:fld>
             <a:endParaRPr lang="es-ES" noProof="0"/>
           </a:p>
@@ -8943,7 +8943,7 @@
             <a:pPr rtl="0"/>
             <a:fld id="{8CF9F163-DD03-4353-882E-CE0F9A80F1C3}" type="datetime1">
               <a:rPr lang="es-ES" noProof="0" smtClean="0"/>
-              <a:t>01/12/2023</a:t>
+              <a:t>03/12/2023</a:t>
             </a:fld>
             <a:endParaRPr lang="es-ES" noProof="0"/>
           </a:p>
@@ -9181,7 +9181,7 @@
             <a:pPr rtl="0"/>
             <a:fld id="{8D2FF54C-EA2F-453C-857C-5C9ADB86CB43}" type="datetime1">
               <a:rPr lang="es-ES" noProof="0" smtClean="0"/>
-              <a:t>01/12/2023</a:t>
+              <a:t>03/12/2023</a:t>
             </a:fld>
             <a:endParaRPr lang="es-ES" noProof="0"/>
           </a:p>
@@ -9424,7 +9424,7 @@
             <a:pPr rtl="0"/>
             <a:fld id="{57670FF6-52DC-429F-9C56-6A1BF295232E}" type="datetime1">
               <a:rPr lang="es-ES" noProof="0" smtClean="0"/>
-              <a:t>01/12/2023</a:t>
+              <a:t>03/12/2023</a:t>
             </a:fld>
             <a:endParaRPr lang="es-ES" noProof="0"/>
           </a:p>
@@ -9735,7 +9735,7 @@
             <a:pPr rtl="0"/>
             <a:fld id="{85E27922-51B6-4B96-9C28-2CD2060AE75A}" type="datetime1">
               <a:rPr lang="es-ES" noProof="0" smtClean="0"/>
-              <a:t>01/12/2023</a:t>
+              <a:t>03/12/2023</a:t>
             </a:fld>
             <a:endParaRPr lang="es-ES" noProof="0"/>
           </a:p>
@@ -10039,7 +10039,7 @@
             <a:pPr rtl="0"/>
             <a:fld id="{F3ECF5D1-1C98-40FD-9D65-EED7644802B9}" type="datetime1">
               <a:rPr lang="es-ES" noProof="0" smtClean="0"/>
-              <a:t>01/12/2023</a:t>
+              <a:t>03/12/2023</a:t>
             </a:fld>
             <a:endParaRPr lang="es-ES" noProof="0"/>
           </a:p>
@@ -10463,7 +10463,7 @@
             <a:pPr rtl="0"/>
             <a:fld id="{8556C746-EB55-4634-AD93-A9FF2473885C}" type="datetime1">
               <a:rPr lang="es-ES" noProof="0" smtClean="0"/>
-              <a:t>01/12/2023</a:t>
+              <a:t>03/12/2023</a:t>
             </a:fld>
             <a:endParaRPr lang="es-ES" noProof="0"/>
           </a:p>
@@ -10562,7 +10562,7 @@
             <a:pPr rtl="0"/>
             <a:fld id="{C9051F13-F75A-440F-BED7-E2004746A95F}" type="datetime1">
               <a:rPr lang="es-ES" noProof="0" smtClean="0"/>
-              <a:t>01/12/2023</a:t>
+              <a:t>03/12/2023</a:t>
             </a:fld>
             <a:endParaRPr lang="es-ES" noProof="0"/>
           </a:p>
@@ -10728,7 +10728,7 @@
             <a:pPr rtl="0"/>
             <a:fld id="{3D7A2E7D-666A-420B-9042-959E1D47E21D}" type="datetime1">
               <a:rPr lang="es-ES" noProof="0" smtClean="0"/>
-              <a:t>01/12/2023</a:t>
+              <a:t>03/12/2023</a:t>
             </a:fld>
             <a:endParaRPr lang="es-ES" noProof="0"/>
           </a:p>
@@ -11109,7 +11109,7 @@
             <a:pPr rtl="0"/>
             <a:fld id="{0403F12F-0E67-4CAB-8DFD-26DCD4A99D59}" type="datetime1">
               <a:rPr lang="es-ES" noProof="0" smtClean="0"/>
-              <a:t>01/12/2023</a:t>
+              <a:t>03/12/2023</a:t>
             </a:fld>
             <a:endParaRPr lang="es-ES" noProof="0"/>
           </a:p>
@@ -11402,7 +11402,7 @@
             <a:pPr rtl="0"/>
             <a:fld id="{9709DA8C-1A59-4B91-B9EA-509377CD0E23}" type="datetime1">
               <a:rPr lang="es-ES" noProof="0" smtClean="0"/>
-              <a:t>01/12/2023</a:t>
+              <a:t>03/12/2023</a:t>
             </a:fld>
             <a:endParaRPr lang="es-ES" noProof="0"/>
           </a:p>
@@ -11616,7 +11616,7 @@
             <a:pPr rtl="0"/>
             <a:fld id="{A3DF7BF2-42BB-439B-88AA-F60334FF1291}" type="datetime1">
               <a:rPr lang="es-ES" noProof="0" smtClean="0"/>
-              <a:t>01/12/2023</a:t>
+              <a:t>03/12/2023</a:t>
             </a:fld>
             <a:endParaRPr lang="es-ES" noProof="0"/>
           </a:p>
@@ -13564,14 +13564,14 @@
           <p:nvPr>
             <p:extLst>
               <p:ext uri="{D42A27DB-BD31-4B8C-83A1-F6EECF244321}">
-                <p14:modId xmlns:p14="http://schemas.microsoft.com/office/powerpoint/2010/main" val="1405986000"/>
+                <p14:modId xmlns:p14="http://schemas.microsoft.com/office/powerpoint/2010/main" val="1067535490"/>
               </p:ext>
             </p:extLst>
           </p:nvPr>
         </p:nvGraphicFramePr>
         <p:xfrm>
           <a:off x="3386666" y="2799800"/>
-          <a:ext cx="5418666" cy="3708400"/>
+          <a:ext cx="5418666" cy="3337560"/>
         </p:xfrm>
         <a:graphic>
           <a:graphicData uri="http://schemas.openxmlformats.org/drawingml/2006/table">
@@ -13852,42 +13852,6 @@
                 <a:extLst>
                   <a:ext uri="{0D108BD9-81ED-4DB2-BD59-A6C34878D82A}">
                     <a16:rowId xmlns:a16="http://schemas.microsoft.com/office/drawing/2014/main" val="406619084"/>
-                  </a:ext>
-                </a:extLst>
-              </a:tr>
-              <a:tr h="370840">
-                <a:tc>
-                  <a:txBody>
-                    <a:bodyPr/>
-                    <a:lstStyle/>
-                    <a:p>
-                      <a:pPr algn="ctr"/>
-                      <a:r>
-                        <a:rPr lang="es-ES" dirty="0" err="1"/>
-                        <a:t>Connector</a:t>
-                      </a:r>
-                      <a:endParaRPr lang="es-ES" dirty="0"/>
-                    </a:p>
-                  </a:txBody>
-                  <a:tcPr/>
-                </a:tc>
-                <a:tc>
-                  <a:txBody>
-                    <a:bodyPr/>
-                    <a:lstStyle/>
-                    <a:p>
-                      <a:pPr algn="ctr"/>
-                      <a:r>
-                        <a:rPr lang="es-ES" dirty="0"/>
-                        <a:t>Juan Alberto</a:t>
-                      </a:r>
-                    </a:p>
-                  </a:txBody>
-                  <a:tcPr/>
-                </a:tc>
-                <a:extLst>
-                  <a:ext uri="{0D108BD9-81ED-4DB2-BD59-A6C34878D82A}">
-                    <a16:rowId xmlns:a16="http://schemas.microsoft.com/office/drawing/2014/main" val="606922172"/>
                   </a:ext>
                 </a:extLst>
               </a:tr>
@@ -14539,7 +14503,10 @@
           <a:bodyPr/>
           <a:lstStyle/>
           <a:p>
-            <a:endParaRPr lang="es-ES"/>
+            <a:r>
+              <a:rPr lang="es-ES" dirty="0"/>
+              <a:t>Estimación del tiempo dedicado</a:t>
+            </a:r>
           </a:p>
         </p:txBody>
       </p:sp>

</xml_diff>

<commit_message>
Añadidas decisiones de diseño sobre criteria y barman
</commit_message>
<xml_diff>
--- a/Practicas/Practica 1 - Implementacion CAFE/documentation/Presentacion DSL + Cafe.pptx
+++ b/Practicas/Practica 1 - Implementacion CAFE/documentation/Presentacion DSL + Cafe.pptx
@@ -5,20 +5,21 @@
     <p:sldMasterId id="2147483672" r:id="rId1"/>
   </p:sldMasterIdLst>
   <p:notesMasterIdLst>
-    <p:notesMasterId r:id="rId10"/>
+    <p:notesMasterId r:id="rId11"/>
   </p:notesMasterIdLst>
   <p:handoutMasterIdLst>
-    <p:handoutMasterId r:id="rId11"/>
+    <p:handoutMasterId r:id="rId12"/>
   </p:handoutMasterIdLst>
   <p:sldIdLst>
     <p:sldId id="256" r:id="rId2"/>
     <p:sldId id="259" r:id="rId3"/>
     <p:sldId id="262" r:id="rId4"/>
-    <p:sldId id="263" r:id="rId5"/>
-    <p:sldId id="264" r:id="rId6"/>
-    <p:sldId id="265" r:id="rId7"/>
-    <p:sldId id="266" r:id="rId8"/>
-    <p:sldId id="260" r:id="rId9"/>
+    <p:sldId id="267" r:id="rId5"/>
+    <p:sldId id="263" r:id="rId6"/>
+    <p:sldId id="264" r:id="rId7"/>
+    <p:sldId id="265" r:id="rId8"/>
+    <p:sldId id="266" r:id="rId9"/>
+    <p:sldId id="260" r:id="rId10"/>
   </p:sldIdLst>
   <p:sldSz cx="12192000" cy="6858000"/>
   <p:notesSz cx="6858000" cy="9144000"/>
@@ -3338,6 +3339,753 @@
 </dgm:colorsDef>
 </file>
 
+<file path=ppt/diagrams/colors3.xml><?xml version="1.0" encoding="utf-8"?>
+<dgm:colorsDef xmlns:dgm="http://schemas.openxmlformats.org/drawingml/2006/diagram" xmlns:a="http://schemas.openxmlformats.org/drawingml/2006/main" uniqueId="urn:microsoft.com/office/officeart/2005/8/colors/accent1_2">
+  <dgm:title val=""/>
+  <dgm:desc val=""/>
+  <dgm:catLst>
+    <dgm:cat type="accent1" pri="11200"/>
+  </dgm:catLst>
+  <dgm:styleLbl name="node0">
+    <dgm:fillClrLst meth="repeat">
+      <a:schemeClr val="accent1"/>
+    </dgm:fillClrLst>
+    <dgm:linClrLst meth="repeat">
+      <a:schemeClr val="lt1"/>
+    </dgm:linClrLst>
+    <dgm:effectClrLst/>
+    <dgm:txLinClrLst/>
+    <dgm:txFillClrLst/>
+    <dgm:txEffectClrLst/>
+  </dgm:styleLbl>
+  <dgm:styleLbl name="alignNode1">
+    <dgm:fillClrLst meth="repeat">
+      <a:schemeClr val="accent1"/>
+    </dgm:fillClrLst>
+    <dgm:linClrLst meth="repeat">
+      <a:schemeClr val="accent1"/>
+    </dgm:linClrLst>
+    <dgm:effectClrLst/>
+    <dgm:txLinClrLst/>
+    <dgm:txFillClrLst/>
+    <dgm:txEffectClrLst/>
+  </dgm:styleLbl>
+  <dgm:styleLbl name="node1">
+    <dgm:fillClrLst meth="repeat">
+      <a:schemeClr val="accent1"/>
+    </dgm:fillClrLst>
+    <dgm:linClrLst meth="repeat">
+      <a:schemeClr val="lt1"/>
+    </dgm:linClrLst>
+    <dgm:effectClrLst/>
+    <dgm:txLinClrLst/>
+    <dgm:txFillClrLst/>
+    <dgm:txEffectClrLst/>
+  </dgm:styleLbl>
+  <dgm:styleLbl name="lnNode1">
+    <dgm:fillClrLst meth="repeat">
+      <a:schemeClr val="accent1"/>
+    </dgm:fillClrLst>
+    <dgm:linClrLst meth="repeat">
+      <a:schemeClr val="lt1"/>
+    </dgm:linClrLst>
+    <dgm:effectClrLst/>
+    <dgm:txLinClrLst/>
+    <dgm:txFillClrLst/>
+    <dgm:txEffectClrLst/>
+  </dgm:styleLbl>
+  <dgm:styleLbl name="vennNode1">
+    <dgm:fillClrLst meth="repeat">
+      <a:schemeClr val="accent1">
+        <a:alpha val="50000"/>
+      </a:schemeClr>
+    </dgm:fillClrLst>
+    <dgm:linClrLst meth="repeat">
+      <a:schemeClr val="lt1"/>
+    </dgm:linClrLst>
+    <dgm:effectClrLst/>
+    <dgm:txLinClrLst/>
+    <dgm:txFillClrLst/>
+    <dgm:txEffectClrLst/>
+  </dgm:styleLbl>
+  <dgm:styleLbl name="node2">
+    <dgm:fillClrLst meth="repeat">
+      <a:schemeClr val="accent1"/>
+    </dgm:fillClrLst>
+    <dgm:linClrLst meth="repeat">
+      <a:schemeClr val="lt1"/>
+    </dgm:linClrLst>
+    <dgm:effectClrLst/>
+    <dgm:txLinClrLst/>
+    <dgm:txFillClrLst/>
+    <dgm:txEffectClrLst/>
+  </dgm:styleLbl>
+  <dgm:styleLbl name="node3">
+    <dgm:fillClrLst meth="repeat">
+      <a:schemeClr val="accent1"/>
+    </dgm:fillClrLst>
+    <dgm:linClrLst meth="repeat">
+      <a:schemeClr val="lt1"/>
+    </dgm:linClrLst>
+    <dgm:effectClrLst/>
+    <dgm:txLinClrLst/>
+    <dgm:txFillClrLst/>
+    <dgm:txEffectClrLst/>
+  </dgm:styleLbl>
+  <dgm:styleLbl name="node4">
+    <dgm:fillClrLst meth="repeat">
+      <a:schemeClr val="accent1"/>
+    </dgm:fillClrLst>
+    <dgm:linClrLst meth="repeat">
+      <a:schemeClr val="lt1"/>
+    </dgm:linClrLst>
+    <dgm:effectClrLst/>
+    <dgm:txLinClrLst/>
+    <dgm:txFillClrLst/>
+    <dgm:txEffectClrLst/>
+  </dgm:styleLbl>
+  <dgm:styleLbl name="fgImgPlace1">
+    <dgm:fillClrLst meth="repeat">
+      <a:schemeClr val="accent1">
+        <a:tint val="50000"/>
+      </a:schemeClr>
+    </dgm:fillClrLst>
+    <dgm:linClrLst meth="repeat">
+      <a:schemeClr val="lt1"/>
+    </dgm:linClrLst>
+    <dgm:effectClrLst/>
+    <dgm:txLinClrLst/>
+    <dgm:txFillClrLst meth="repeat">
+      <a:schemeClr val="lt1"/>
+    </dgm:txFillClrLst>
+    <dgm:txEffectClrLst/>
+  </dgm:styleLbl>
+  <dgm:styleLbl name="alignImgPlace1">
+    <dgm:fillClrLst meth="repeat">
+      <a:schemeClr val="accent1">
+        <a:tint val="50000"/>
+      </a:schemeClr>
+    </dgm:fillClrLst>
+    <dgm:linClrLst meth="repeat">
+      <a:schemeClr val="lt1"/>
+    </dgm:linClrLst>
+    <dgm:effectClrLst/>
+    <dgm:txLinClrLst/>
+    <dgm:txFillClrLst meth="repeat">
+      <a:schemeClr val="lt1"/>
+    </dgm:txFillClrLst>
+    <dgm:txEffectClrLst/>
+  </dgm:styleLbl>
+  <dgm:styleLbl name="bgImgPlace1">
+    <dgm:fillClrLst meth="repeat">
+      <a:schemeClr val="accent1">
+        <a:tint val="50000"/>
+      </a:schemeClr>
+    </dgm:fillClrLst>
+    <dgm:linClrLst meth="repeat">
+      <a:schemeClr val="lt1"/>
+    </dgm:linClrLst>
+    <dgm:effectClrLst/>
+    <dgm:txLinClrLst/>
+    <dgm:txFillClrLst meth="repeat">
+      <a:schemeClr val="lt1"/>
+    </dgm:txFillClrLst>
+    <dgm:txEffectClrLst/>
+  </dgm:styleLbl>
+  <dgm:styleLbl name="sibTrans2D1">
+    <dgm:fillClrLst meth="repeat">
+      <a:schemeClr val="accent1">
+        <a:tint val="60000"/>
+      </a:schemeClr>
+    </dgm:fillClrLst>
+    <dgm:linClrLst meth="repeat">
+      <a:schemeClr val="accent1">
+        <a:tint val="60000"/>
+      </a:schemeClr>
+    </dgm:linClrLst>
+    <dgm:effectClrLst/>
+    <dgm:txLinClrLst/>
+    <dgm:txFillClrLst/>
+    <dgm:txEffectClrLst/>
+  </dgm:styleLbl>
+  <dgm:styleLbl name="fgSibTrans2D1">
+    <dgm:fillClrLst meth="repeat">
+      <a:schemeClr val="accent1">
+        <a:tint val="60000"/>
+      </a:schemeClr>
+    </dgm:fillClrLst>
+    <dgm:linClrLst meth="repeat">
+      <a:schemeClr val="accent1">
+        <a:tint val="60000"/>
+      </a:schemeClr>
+    </dgm:linClrLst>
+    <dgm:effectClrLst/>
+    <dgm:txLinClrLst/>
+    <dgm:txFillClrLst/>
+    <dgm:txEffectClrLst/>
+  </dgm:styleLbl>
+  <dgm:styleLbl name="bgSibTrans2D1">
+    <dgm:fillClrLst meth="repeat">
+      <a:schemeClr val="accent1">
+        <a:tint val="60000"/>
+      </a:schemeClr>
+    </dgm:fillClrLst>
+    <dgm:linClrLst meth="repeat">
+      <a:schemeClr val="accent1">
+        <a:tint val="60000"/>
+      </a:schemeClr>
+    </dgm:linClrLst>
+    <dgm:effectClrLst/>
+    <dgm:txLinClrLst/>
+    <dgm:txFillClrLst/>
+    <dgm:txEffectClrLst/>
+  </dgm:styleLbl>
+  <dgm:styleLbl name="sibTrans1D1">
+    <dgm:fillClrLst meth="repeat">
+      <a:schemeClr val="accent1"/>
+    </dgm:fillClrLst>
+    <dgm:linClrLst meth="repeat">
+      <a:schemeClr val="accent1"/>
+    </dgm:linClrLst>
+    <dgm:effectClrLst/>
+    <dgm:txLinClrLst/>
+    <dgm:txFillClrLst meth="repeat">
+      <a:schemeClr val="tx1"/>
+    </dgm:txFillClrLst>
+    <dgm:txEffectClrLst/>
+  </dgm:styleLbl>
+  <dgm:styleLbl name="callout">
+    <dgm:fillClrLst meth="repeat">
+      <a:schemeClr val="accent1"/>
+    </dgm:fillClrLst>
+    <dgm:linClrLst meth="repeat">
+      <a:schemeClr val="accent1">
+        <a:tint val="50000"/>
+      </a:schemeClr>
+    </dgm:linClrLst>
+    <dgm:effectClrLst/>
+    <dgm:txLinClrLst/>
+    <dgm:txFillClrLst meth="repeat">
+      <a:schemeClr val="tx1"/>
+    </dgm:txFillClrLst>
+    <dgm:txEffectClrLst/>
+  </dgm:styleLbl>
+  <dgm:styleLbl name="asst0">
+    <dgm:fillClrLst meth="repeat">
+      <a:schemeClr val="accent1"/>
+    </dgm:fillClrLst>
+    <dgm:linClrLst meth="repeat">
+      <a:schemeClr val="lt1"/>
+    </dgm:linClrLst>
+    <dgm:effectClrLst/>
+    <dgm:txLinClrLst/>
+    <dgm:txFillClrLst/>
+    <dgm:txEffectClrLst/>
+  </dgm:styleLbl>
+  <dgm:styleLbl name="asst1">
+    <dgm:fillClrLst meth="repeat">
+      <a:schemeClr val="accent1"/>
+    </dgm:fillClrLst>
+    <dgm:linClrLst meth="repeat">
+      <a:schemeClr val="lt1"/>
+    </dgm:linClrLst>
+    <dgm:effectClrLst/>
+    <dgm:txLinClrLst/>
+    <dgm:txFillClrLst/>
+    <dgm:txEffectClrLst/>
+  </dgm:styleLbl>
+  <dgm:styleLbl name="asst2">
+    <dgm:fillClrLst meth="repeat">
+      <a:schemeClr val="accent1"/>
+    </dgm:fillClrLst>
+    <dgm:linClrLst meth="repeat">
+      <a:schemeClr val="lt1"/>
+    </dgm:linClrLst>
+    <dgm:effectClrLst/>
+    <dgm:txLinClrLst/>
+    <dgm:txFillClrLst/>
+    <dgm:txEffectClrLst/>
+  </dgm:styleLbl>
+  <dgm:styleLbl name="asst3">
+    <dgm:fillClrLst meth="repeat">
+      <a:schemeClr val="accent1"/>
+    </dgm:fillClrLst>
+    <dgm:linClrLst meth="repeat">
+      <a:schemeClr val="lt1"/>
+    </dgm:linClrLst>
+    <dgm:effectClrLst/>
+    <dgm:txLinClrLst/>
+    <dgm:txFillClrLst/>
+    <dgm:txEffectClrLst/>
+  </dgm:styleLbl>
+  <dgm:styleLbl name="asst4">
+    <dgm:fillClrLst meth="repeat">
+      <a:schemeClr val="accent1"/>
+    </dgm:fillClrLst>
+    <dgm:linClrLst meth="repeat">
+      <a:schemeClr val="lt1"/>
+    </dgm:linClrLst>
+    <dgm:effectClrLst/>
+    <dgm:txLinClrLst/>
+    <dgm:txFillClrLst/>
+    <dgm:txEffectClrLst/>
+  </dgm:styleLbl>
+  <dgm:styleLbl name="parChTrans2D1">
+    <dgm:fillClrLst meth="repeat">
+      <a:schemeClr val="accent1">
+        <a:tint val="60000"/>
+      </a:schemeClr>
+    </dgm:fillClrLst>
+    <dgm:linClrLst meth="repeat">
+      <a:schemeClr val="accent1">
+        <a:tint val="60000"/>
+      </a:schemeClr>
+    </dgm:linClrLst>
+    <dgm:effectClrLst/>
+    <dgm:txLinClrLst/>
+    <dgm:txFillClrLst meth="repeat">
+      <a:schemeClr val="lt1"/>
+    </dgm:txFillClrLst>
+    <dgm:txEffectClrLst/>
+  </dgm:styleLbl>
+  <dgm:styleLbl name="parChTrans2D2">
+    <dgm:fillClrLst meth="repeat">
+      <a:schemeClr val="accent1"/>
+    </dgm:fillClrLst>
+    <dgm:linClrLst meth="repeat">
+      <a:schemeClr val="accent1"/>
+    </dgm:linClrLst>
+    <dgm:effectClrLst/>
+    <dgm:txLinClrLst/>
+    <dgm:txFillClrLst meth="repeat">
+      <a:schemeClr val="lt1"/>
+    </dgm:txFillClrLst>
+    <dgm:txEffectClrLst/>
+  </dgm:styleLbl>
+  <dgm:styleLbl name="parChTrans2D3">
+    <dgm:fillClrLst meth="repeat">
+      <a:schemeClr val="accent1"/>
+    </dgm:fillClrLst>
+    <dgm:linClrLst meth="repeat">
+      <a:schemeClr val="accent1"/>
+    </dgm:linClrLst>
+    <dgm:effectClrLst/>
+    <dgm:txLinClrLst/>
+    <dgm:txFillClrLst meth="repeat">
+      <a:schemeClr val="lt1"/>
+    </dgm:txFillClrLst>
+    <dgm:txEffectClrLst/>
+  </dgm:styleLbl>
+  <dgm:styleLbl name="parChTrans2D4">
+    <dgm:fillClrLst meth="repeat">
+      <a:schemeClr val="accent1"/>
+    </dgm:fillClrLst>
+    <dgm:linClrLst meth="repeat">
+      <a:schemeClr val="accent1"/>
+    </dgm:linClrLst>
+    <dgm:effectClrLst/>
+    <dgm:txLinClrLst/>
+    <dgm:txFillClrLst meth="repeat">
+      <a:schemeClr val="lt1"/>
+    </dgm:txFillClrLst>
+    <dgm:txEffectClrLst/>
+  </dgm:styleLbl>
+  <dgm:styleLbl name="parChTrans1D1">
+    <dgm:fillClrLst meth="repeat">
+      <a:schemeClr val="accent1"/>
+    </dgm:fillClrLst>
+    <dgm:linClrLst meth="repeat">
+      <a:schemeClr val="accent1">
+        <a:shade val="60000"/>
+      </a:schemeClr>
+    </dgm:linClrLst>
+    <dgm:effectClrLst/>
+    <dgm:txLinClrLst/>
+    <dgm:txFillClrLst meth="repeat">
+      <a:schemeClr val="tx1"/>
+    </dgm:txFillClrLst>
+    <dgm:txEffectClrLst/>
+  </dgm:styleLbl>
+  <dgm:styleLbl name="parChTrans1D2">
+    <dgm:fillClrLst meth="repeat">
+      <a:schemeClr val="accent1"/>
+    </dgm:fillClrLst>
+    <dgm:linClrLst meth="repeat">
+      <a:schemeClr val="accent1">
+        <a:shade val="60000"/>
+      </a:schemeClr>
+    </dgm:linClrLst>
+    <dgm:effectClrLst/>
+    <dgm:txLinClrLst/>
+    <dgm:txFillClrLst meth="repeat">
+      <a:schemeClr val="tx1"/>
+    </dgm:txFillClrLst>
+    <dgm:txEffectClrLst/>
+  </dgm:styleLbl>
+  <dgm:styleLbl name="parChTrans1D3">
+    <dgm:fillClrLst meth="repeat">
+      <a:schemeClr val="accent1"/>
+    </dgm:fillClrLst>
+    <dgm:linClrLst meth="repeat">
+      <a:schemeClr val="accent1">
+        <a:shade val="80000"/>
+      </a:schemeClr>
+    </dgm:linClrLst>
+    <dgm:effectClrLst/>
+    <dgm:txLinClrLst/>
+    <dgm:txFillClrLst meth="repeat">
+      <a:schemeClr val="tx1"/>
+    </dgm:txFillClrLst>
+    <dgm:txEffectClrLst/>
+  </dgm:styleLbl>
+  <dgm:styleLbl name="parChTrans1D4">
+    <dgm:fillClrLst meth="repeat">
+      <a:schemeClr val="accent1"/>
+    </dgm:fillClrLst>
+    <dgm:linClrLst meth="repeat">
+      <a:schemeClr val="accent1">
+        <a:shade val="80000"/>
+      </a:schemeClr>
+    </dgm:linClrLst>
+    <dgm:effectClrLst/>
+    <dgm:txLinClrLst/>
+    <dgm:txFillClrLst meth="repeat">
+      <a:schemeClr val="tx1"/>
+    </dgm:txFillClrLst>
+    <dgm:txEffectClrLst/>
+  </dgm:styleLbl>
+  <dgm:styleLbl name="fgAcc1">
+    <dgm:fillClrLst meth="repeat">
+      <a:schemeClr val="lt1">
+        <a:alpha val="90000"/>
+      </a:schemeClr>
+    </dgm:fillClrLst>
+    <dgm:linClrLst meth="repeat">
+      <a:schemeClr val="accent1"/>
+    </dgm:linClrLst>
+    <dgm:effectClrLst/>
+    <dgm:txLinClrLst/>
+    <dgm:txFillClrLst meth="repeat">
+      <a:schemeClr val="dk1"/>
+    </dgm:txFillClrLst>
+    <dgm:txEffectClrLst/>
+  </dgm:styleLbl>
+  <dgm:styleLbl name="conFgAcc1">
+    <dgm:fillClrLst meth="repeat">
+      <a:schemeClr val="lt1">
+        <a:alpha val="90000"/>
+      </a:schemeClr>
+    </dgm:fillClrLst>
+    <dgm:linClrLst meth="repeat">
+      <a:schemeClr val="accent1"/>
+    </dgm:linClrLst>
+    <dgm:effectClrLst/>
+    <dgm:txLinClrLst/>
+    <dgm:txFillClrLst meth="repeat">
+      <a:schemeClr val="dk1"/>
+    </dgm:txFillClrLst>
+    <dgm:txEffectClrLst/>
+  </dgm:styleLbl>
+  <dgm:styleLbl name="alignAcc1">
+    <dgm:fillClrLst meth="repeat">
+      <a:schemeClr val="lt1">
+        <a:alpha val="90000"/>
+      </a:schemeClr>
+    </dgm:fillClrLst>
+    <dgm:linClrLst meth="repeat">
+      <a:schemeClr val="accent1"/>
+    </dgm:linClrLst>
+    <dgm:effectClrLst/>
+    <dgm:txLinClrLst/>
+    <dgm:txFillClrLst meth="repeat">
+      <a:schemeClr val="dk1"/>
+    </dgm:txFillClrLst>
+    <dgm:txEffectClrLst/>
+  </dgm:styleLbl>
+  <dgm:styleLbl name="trAlignAcc1">
+    <dgm:fillClrLst meth="repeat">
+      <a:schemeClr val="lt1">
+        <a:alpha val="40000"/>
+      </a:schemeClr>
+    </dgm:fillClrLst>
+    <dgm:linClrLst meth="repeat">
+      <a:schemeClr val="accent1"/>
+    </dgm:linClrLst>
+    <dgm:effectClrLst/>
+    <dgm:txLinClrLst/>
+    <dgm:txFillClrLst meth="repeat">
+      <a:schemeClr val="dk1"/>
+    </dgm:txFillClrLst>
+    <dgm:txEffectClrLst/>
+  </dgm:styleLbl>
+  <dgm:styleLbl name="bgAcc1">
+    <dgm:fillClrLst meth="repeat">
+      <a:schemeClr val="lt1">
+        <a:alpha val="90000"/>
+      </a:schemeClr>
+    </dgm:fillClrLst>
+    <dgm:linClrLst meth="repeat">
+      <a:schemeClr val="accent1"/>
+    </dgm:linClrLst>
+    <dgm:effectClrLst/>
+    <dgm:txLinClrLst/>
+    <dgm:txFillClrLst meth="repeat">
+      <a:schemeClr val="dk1"/>
+    </dgm:txFillClrLst>
+    <dgm:txEffectClrLst/>
+  </dgm:styleLbl>
+  <dgm:styleLbl name="solidFgAcc1">
+    <dgm:fillClrLst meth="repeat">
+      <a:schemeClr val="lt1"/>
+    </dgm:fillClrLst>
+    <dgm:linClrLst meth="repeat">
+      <a:schemeClr val="accent1"/>
+    </dgm:linClrLst>
+    <dgm:effectClrLst/>
+    <dgm:txLinClrLst/>
+    <dgm:txFillClrLst meth="repeat">
+      <a:schemeClr val="dk1"/>
+    </dgm:txFillClrLst>
+    <dgm:txEffectClrLst/>
+  </dgm:styleLbl>
+  <dgm:styleLbl name="solidAlignAcc1">
+    <dgm:fillClrLst meth="repeat">
+      <a:schemeClr val="lt1"/>
+    </dgm:fillClrLst>
+    <dgm:linClrLst meth="repeat">
+      <a:schemeClr val="accent1"/>
+    </dgm:linClrLst>
+    <dgm:effectClrLst/>
+    <dgm:txLinClrLst/>
+    <dgm:txFillClrLst meth="repeat">
+      <a:schemeClr val="dk1"/>
+    </dgm:txFillClrLst>
+    <dgm:txEffectClrLst/>
+  </dgm:styleLbl>
+  <dgm:styleLbl name="solidBgAcc1">
+    <dgm:fillClrLst meth="repeat">
+      <a:schemeClr val="lt1"/>
+    </dgm:fillClrLst>
+    <dgm:linClrLst meth="repeat">
+      <a:schemeClr val="accent1"/>
+    </dgm:linClrLst>
+    <dgm:effectClrLst/>
+    <dgm:txLinClrLst/>
+    <dgm:txFillClrLst meth="repeat">
+      <a:schemeClr val="dk1"/>
+    </dgm:txFillClrLst>
+    <dgm:txEffectClrLst/>
+  </dgm:styleLbl>
+  <dgm:styleLbl name="fgAccFollowNode1">
+    <dgm:fillClrLst meth="repeat">
+      <a:schemeClr val="accent1">
+        <a:alpha val="90000"/>
+        <a:tint val="40000"/>
+      </a:schemeClr>
+    </dgm:fillClrLst>
+    <dgm:linClrLst meth="repeat">
+      <a:schemeClr val="accent1">
+        <a:alpha val="90000"/>
+        <a:tint val="40000"/>
+      </a:schemeClr>
+    </dgm:linClrLst>
+    <dgm:effectClrLst/>
+    <dgm:txLinClrLst/>
+    <dgm:txFillClrLst meth="repeat">
+      <a:schemeClr val="dk1"/>
+    </dgm:txFillClrLst>
+    <dgm:txEffectClrLst/>
+  </dgm:styleLbl>
+  <dgm:styleLbl name="alignAccFollowNode1">
+    <dgm:fillClrLst meth="repeat">
+      <a:schemeClr val="accent1">
+        <a:alpha val="90000"/>
+        <a:tint val="40000"/>
+      </a:schemeClr>
+    </dgm:fillClrLst>
+    <dgm:linClrLst meth="repeat">
+      <a:schemeClr val="accent1">
+        <a:alpha val="90000"/>
+        <a:tint val="40000"/>
+      </a:schemeClr>
+    </dgm:linClrLst>
+    <dgm:effectClrLst/>
+    <dgm:txLinClrLst/>
+    <dgm:txFillClrLst meth="repeat">
+      <a:schemeClr val="dk1"/>
+    </dgm:txFillClrLst>
+    <dgm:txEffectClrLst/>
+  </dgm:styleLbl>
+  <dgm:styleLbl name="bgAccFollowNode1">
+    <dgm:fillClrLst meth="repeat">
+      <a:schemeClr val="accent1">
+        <a:alpha val="90000"/>
+        <a:tint val="40000"/>
+      </a:schemeClr>
+    </dgm:fillClrLst>
+    <dgm:linClrLst meth="repeat">
+      <a:schemeClr val="accent1">
+        <a:alpha val="90000"/>
+        <a:tint val="40000"/>
+      </a:schemeClr>
+    </dgm:linClrLst>
+    <dgm:effectClrLst/>
+    <dgm:txLinClrLst/>
+    <dgm:txFillClrLst meth="repeat">
+      <a:schemeClr val="dk1"/>
+    </dgm:txFillClrLst>
+    <dgm:txEffectClrLst/>
+  </dgm:styleLbl>
+  <dgm:styleLbl name="fgAcc0">
+    <dgm:fillClrLst meth="repeat">
+      <a:schemeClr val="lt1">
+        <a:alpha val="90000"/>
+      </a:schemeClr>
+    </dgm:fillClrLst>
+    <dgm:linClrLst meth="repeat">
+      <a:schemeClr val="accent1"/>
+    </dgm:linClrLst>
+    <dgm:effectClrLst/>
+    <dgm:txLinClrLst/>
+    <dgm:txFillClrLst meth="repeat">
+      <a:schemeClr val="dk1"/>
+    </dgm:txFillClrLst>
+    <dgm:txEffectClrLst/>
+  </dgm:styleLbl>
+  <dgm:styleLbl name="fgAcc2">
+    <dgm:fillClrLst meth="repeat">
+      <a:schemeClr val="lt1">
+        <a:alpha val="90000"/>
+      </a:schemeClr>
+    </dgm:fillClrLst>
+    <dgm:linClrLst meth="repeat">
+      <a:schemeClr val="accent1"/>
+    </dgm:linClrLst>
+    <dgm:effectClrLst/>
+    <dgm:txLinClrLst/>
+    <dgm:txFillClrLst meth="repeat">
+      <a:schemeClr val="dk1"/>
+    </dgm:txFillClrLst>
+    <dgm:txEffectClrLst/>
+  </dgm:styleLbl>
+  <dgm:styleLbl name="fgAcc3">
+    <dgm:fillClrLst meth="repeat">
+      <a:schemeClr val="lt1">
+        <a:alpha val="90000"/>
+      </a:schemeClr>
+    </dgm:fillClrLst>
+    <dgm:linClrLst meth="repeat">
+      <a:schemeClr val="accent1"/>
+    </dgm:linClrLst>
+    <dgm:effectClrLst/>
+    <dgm:txLinClrLst/>
+    <dgm:txFillClrLst meth="repeat">
+      <a:schemeClr val="dk1"/>
+    </dgm:txFillClrLst>
+    <dgm:txEffectClrLst/>
+  </dgm:styleLbl>
+  <dgm:styleLbl name="fgAcc4">
+    <dgm:fillClrLst meth="repeat">
+      <a:schemeClr val="lt1">
+        <a:alpha val="90000"/>
+      </a:schemeClr>
+    </dgm:fillClrLst>
+    <dgm:linClrLst meth="repeat">
+      <a:schemeClr val="accent1"/>
+    </dgm:linClrLst>
+    <dgm:effectClrLst/>
+    <dgm:txLinClrLst/>
+    <dgm:txFillClrLst meth="repeat">
+      <a:schemeClr val="dk1"/>
+    </dgm:txFillClrLst>
+    <dgm:txEffectClrLst/>
+  </dgm:styleLbl>
+  <dgm:styleLbl name="bgShp">
+    <dgm:fillClrLst meth="repeat">
+      <a:schemeClr val="accent1">
+        <a:tint val="40000"/>
+      </a:schemeClr>
+    </dgm:fillClrLst>
+    <dgm:linClrLst meth="repeat">
+      <a:schemeClr val="accent1"/>
+    </dgm:linClrLst>
+    <dgm:effectClrLst/>
+    <dgm:txLinClrLst/>
+    <dgm:txFillClrLst meth="repeat">
+      <a:schemeClr val="dk1"/>
+    </dgm:txFillClrLst>
+    <dgm:txEffectClrLst/>
+  </dgm:styleLbl>
+  <dgm:styleLbl name="dkBgShp">
+    <dgm:fillClrLst meth="repeat">
+      <a:schemeClr val="accent1">
+        <a:shade val="80000"/>
+      </a:schemeClr>
+    </dgm:fillClrLst>
+    <dgm:linClrLst meth="repeat">
+      <a:schemeClr val="accent1"/>
+    </dgm:linClrLst>
+    <dgm:effectClrLst/>
+    <dgm:txLinClrLst/>
+    <dgm:txFillClrLst meth="repeat">
+      <a:schemeClr val="lt1"/>
+    </dgm:txFillClrLst>
+    <dgm:txEffectClrLst/>
+  </dgm:styleLbl>
+  <dgm:styleLbl name="trBgShp">
+    <dgm:fillClrLst meth="repeat">
+      <a:schemeClr val="accent1">
+        <a:tint val="50000"/>
+        <a:alpha val="40000"/>
+      </a:schemeClr>
+    </dgm:fillClrLst>
+    <dgm:linClrLst meth="repeat">
+      <a:schemeClr val="accent1"/>
+    </dgm:linClrLst>
+    <dgm:effectClrLst/>
+    <dgm:txLinClrLst/>
+    <dgm:txFillClrLst meth="repeat">
+      <a:schemeClr val="lt1"/>
+    </dgm:txFillClrLst>
+    <dgm:txEffectClrLst/>
+  </dgm:styleLbl>
+  <dgm:styleLbl name="fgShp">
+    <dgm:fillClrLst meth="repeat">
+      <a:schemeClr val="accent1">
+        <a:tint val="60000"/>
+      </a:schemeClr>
+    </dgm:fillClrLst>
+    <dgm:linClrLst meth="repeat">
+      <a:schemeClr val="lt1"/>
+    </dgm:linClrLst>
+    <dgm:effectClrLst/>
+    <dgm:txLinClrLst/>
+    <dgm:txFillClrLst meth="repeat">
+      <a:schemeClr val="dk1"/>
+    </dgm:txFillClrLst>
+    <dgm:txEffectClrLst/>
+  </dgm:styleLbl>
+  <dgm:styleLbl name="revTx">
+    <dgm:fillClrLst meth="repeat">
+      <a:schemeClr val="lt1">
+        <a:alpha val="0"/>
+      </a:schemeClr>
+    </dgm:fillClrLst>
+    <dgm:linClrLst meth="repeat">
+      <a:schemeClr val="dk1">
+        <a:alpha val="0"/>
+      </a:schemeClr>
+    </dgm:linClrLst>
+    <dgm:effectClrLst/>
+    <dgm:txLinClrLst/>
+    <dgm:txFillClrLst meth="repeat">
+      <a:schemeClr val="tx1"/>
+    </dgm:txFillClrLst>
+    <dgm:txEffectClrLst/>
+  </dgm:styleLbl>
+</dgm:colorsDef>
+</file>
+
 <file path=ppt/diagrams/data1.xml><?xml version="1.0" encoding="utf-8"?>
 <dgm:dataModel xmlns:dgm="http://schemas.openxmlformats.org/drawingml/2006/diagram" xmlns:a="http://schemas.openxmlformats.org/drawingml/2006/main">
   <dgm:ptLst>
@@ -3601,6 +4349,36 @@
 </file>
 
 <file path=ppt/diagrams/data2.xml><?xml version="1.0" encoding="utf-8"?>
+<dgm:dataModel xmlns:dgm="http://schemas.openxmlformats.org/drawingml/2006/diagram" xmlns:a="http://schemas.openxmlformats.org/drawingml/2006/main">
+  <dgm:ptLst>
+    <dgm:pt modelId="{190CC646-2560-4B7B-B029-1EDA70C20177}" type="doc">
+      <dgm:prSet loTypeId="urn:microsoft.com/office/officeart/2005/8/layout/vList3" loCatId="list" qsTypeId="urn:microsoft.com/office/officeart/2005/8/quickstyle/simple1" qsCatId="simple" csTypeId="urn:microsoft.com/office/officeart/2005/8/colors/accent1_2" csCatId="accent1" phldr="1"/>
+      <dgm:spPr/>
+    </dgm:pt>
+    <dgm:pt modelId="{C8172DF0-236A-40F9-844F-B3D51B6B1026}" type="pres">
+      <dgm:prSet presAssocID="{190CC646-2560-4B7B-B029-1EDA70C20177}" presName="linearFlow" presStyleCnt="0">
+        <dgm:presLayoutVars>
+          <dgm:dir/>
+          <dgm:resizeHandles val="exact"/>
+        </dgm:presLayoutVars>
+      </dgm:prSet>
+      <dgm:spPr/>
+    </dgm:pt>
+  </dgm:ptLst>
+  <dgm:cxnLst>
+    <dgm:cxn modelId="{7C5A8694-2FAB-48E7-AB44-7F07FD4CED86}" type="presOf" srcId="{190CC646-2560-4B7B-B029-1EDA70C20177}" destId="{C8172DF0-236A-40F9-844F-B3D51B6B1026}" srcOrd="0" destOrd="0" presId="urn:microsoft.com/office/officeart/2005/8/layout/vList3"/>
+  </dgm:cxnLst>
+  <dgm:bg/>
+  <dgm:whole/>
+  <dgm:extLst>
+    <a:ext uri="http://schemas.microsoft.com/office/drawing/2008/diagram">
+      <dsp:dataModelExt xmlns:dsp="http://schemas.microsoft.com/office/drawing/2008/diagram" relId="rId6" minVer="http://schemas.openxmlformats.org/drawingml/2006/diagram"/>
+    </a:ext>
+  </dgm:extLst>
+</dgm:dataModel>
+</file>
+
+<file path=ppt/diagrams/data3.xml><?xml version="1.0" encoding="utf-8"?>
 <dgm:dataModel xmlns:dgm="http://schemas.openxmlformats.org/drawingml/2006/diagram" xmlns:a="http://schemas.openxmlformats.org/drawingml/2006/main">
   <dgm:ptLst>
     <dgm:pt modelId="{190CC646-2560-4B7B-B029-1EDA70C20177}" type="doc">
@@ -4105,6 +4883,18 @@
 </file>
 
 <file path=ppt/diagrams/drawing2.xml><?xml version="1.0" encoding="utf-8"?>
+<dsp:drawing xmlns:dgm="http://schemas.openxmlformats.org/drawingml/2006/diagram" xmlns:dsp="http://schemas.microsoft.com/office/drawing/2008/diagram" xmlns:a="http://schemas.openxmlformats.org/drawingml/2006/main">
+  <dsp:spTree>
+    <dsp:nvGrpSpPr>
+      <dsp:cNvPr id="0" name=""/>
+      <dsp:cNvGrpSpPr/>
+    </dsp:nvGrpSpPr>
+    <dsp:grpSpPr/>
+  </dsp:spTree>
+</dsp:drawing>
+</file>
+
+<file path=ppt/diagrams/drawing3.xml><?xml version="1.0" encoding="utf-8"?>
 <dsp:drawing xmlns:dgm="http://schemas.openxmlformats.org/drawingml/2006/diagram" xmlns:dsp="http://schemas.microsoft.com/office/drawing/2008/diagram" xmlns:a="http://schemas.openxmlformats.org/drawingml/2006/main">
   <dsp:spTree>
     <dsp:nvGrpSpPr>
@@ -5557,6 +6347,169 @@
 </dgm:layoutDef>
 </file>
 
+<file path=ppt/diagrams/layout3.xml><?xml version="1.0" encoding="utf-8"?>
+<dgm:layoutDef xmlns:dgm="http://schemas.openxmlformats.org/drawingml/2006/diagram" xmlns:a="http://schemas.openxmlformats.org/drawingml/2006/main" uniqueId="urn:microsoft.com/office/officeart/2005/8/layout/vList3">
+  <dgm:title val=""/>
+  <dgm:desc val=""/>
+  <dgm:catLst>
+    <dgm:cat type="list" pri="14000"/>
+    <dgm:cat type="convert" pri="3000"/>
+    <dgm:cat type="picture" pri="27000"/>
+    <dgm:cat type="pictureconvert" pri="27000"/>
+  </dgm:catLst>
+  <dgm:sampData useDef="1">
+    <dgm:dataModel>
+      <dgm:ptLst/>
+      <dgm:bg/>
+      <dgm:whole/>
+    </dgm:dataModel>
+  </dgm:sampData>
+  <dgm:styleData>
+    <dgm:dataModel>
+      <dgm:ptLst>
+        <dgm:pt modelId="0" type="doc"/>
+        <dgm:pt modelId="1"/>
+        <dgm:pt modelId="2"/>
+      </dgm:ptLst>
+      <dgm:cxnLst>
+        <dgm:cxn modelId="3" srcId="0" destId="1" srcOrd="0" destOrd="0"/>
+        <dgm:cxn modelId="4" srcId="0" destId="2" srcOrd="1" destOrd="0"/>
+      </dgm:cxnLst>
+      <dgm:bg/>
+      <dgm:whole/>
+    </dgm:dataModel>
+  </dgm:styleData>
+  <dgm:clrData>
+    <dgm:dataModel>
+      <dgm:ptLst>
+        <dgm:pt modelId="0" type="doc"/>
+        <dgm:pt modelId="1"/>
+        <dgm:pt modelId="2"/>
+        <dgm:pt modelId="3"/>
+        <dgm:pt modelId="4"/>
+      </dgm:ptLst>
+      <dgm:cxnLst>
+        <dgm:cxn modelId="5" srcId="0" destId="1" srcOrd="0" destOrd="0"/>
+        <dgm:cxn modelId="6" srcId="0" destId="2" srcOrd="1" destOrd="0"/>
+        <dgm:cxn modelId="7" srcId="0" destId="3" srcOrd="2" destOrd="0"/>
+        <dgm:cxn modelId="8" srcId="0" destId="4" srcOrd="3" destOrd="0"/>
+      </dgm:cxnLst>
+      <dgm:bg/>
+      <dgm:whole/>
+    </dgm:dataModel>
+  </dgm:clrData>
+  <dgm:layoutNode name="linearFlow">
+    <dgm:varLst>
+      <dgm:dir/>
+      <dgm:resizeHandles val="exact"/>
+    </dgm:varLst>
+    <dgm:alg type="lin">
+      <dgm:param type="linDir" val="fromT"/>
+      <dgm:param type="vertAlign" val="mid"/>
+      <dgm:param type="horzAlign" val="ctr"/>
+    </dgm:alg>
+    <dgm:shape xmlns:r="http://schemas.openxmlformats.org/officeDocument/2006/relationships" r:blip="">
+      <dgm:adjLst/>
+    </dgm:shape>
+    <dgm:presOf/>
+    <dgm:constrLst>
+      <dgm:constr type="w" for="ch" forName="composite" refType="w"/>
+      <dgm:constr type="h" for="ch" forName="composite" refType="h"/>
+      <dgm:constr type="h" for="ch" forName="spacing" refType="h" refFor="ch" refForName="composite" fact="0.25"/>
+      <dgm:constr type="h" for="ch" forName="spacing" refType="w" op="lte" fact="0.1"/>
+      <dgm:constr type="primFontSz" for="des" ptType="node" op="equ" val="65"/>
+    </dgm:constrLst>
+    <dgm:ruleLst/>
+    <dgm:forEach name="Name0" axis="ch" ptType="node">
+      <dgm:layoutNode name="composite">
+        <dgm:alg type="composite"/>
+        <dgm:shape xmlns:r="http://schemas.openxmlformats.org/officeDocument/2006/relationships" r:blip="">
+          <dgm:adjLst/>
+        </dgm:shape>
+        <dgm:presOf/>
+        <dgm:choose name="Name1">
+          <dgm:if name="Name2" func="var" arg="dir" op="equ" val="norm">
+            <dgm:constrLst>
+              <dgm:constr type="w" for="ch" forName="imgShp" refType="w" fact="0.335"/>
+              <dgm:constr type="h" for="ch" forName="imgShp" refType="w" refFor="ch" refForName="imgShp" op="equ"/>
+              <dgm:constr type="h" for="ch" forName="imgShp" refType="h" op="lte"/>
+              <dgm:constr type="ctrY" for="ch" forName="imgShp" refType="h" fact="0.5"/>
+              <dgm:constr type="l" for="ch" forName="imgShp"/>
+              <dgm:constr type="w" for="ch" forName="txShp" refType="w" op="equ" fact="0.665"/>
+              <dgm:constr type="h" for="ch" forName="txShp" refType="h" refFor="ch" refForName="imgShp" op="equ"/>
+              <dgm:constr type="ctrY" for="ch" forName="txShp" refType="h" fact="0.5"/>
+              <dgm:constr type="l" for="ch" forName="txShp" refType="w" refFor="ch" refForName="imgShp" fact="0.5"/>
+              <dgm:constr type="lMarg" for="ch" forName="txShp" refType="w" refFor="ch" refForName="imgShp" fact="1.25"/>
+            </dgm:constrLst>
+          </dgm:if>
+          <dgm:else name="Name3">
+            <dgm:constrLst>
+              <dgm:constr type="w" for="ch" forName="imgShp" refType="w" fact="0.335"/>
+              <dgm:constr type="h" for="ch" forName="imgShp" refType="w" refFor="ch" refForName="imgShp" op="equ"/>
+              <dgm:constr type="h" for="ch" forName="imgShp" refType="h" op="lte"/>
+              <dgm:constr type="ctrY" for="ch" forName="imgShp" refType="h" fact="0.5"/>
+              <dgm:constr type="r" for="ch" forName="imgShp" refType="w"/>
+              <dgm:constr type="w" for="ch" forName="txShp" refType="w" op="equ" fact="0.665"/>
+              <dgm:constr type="h" for="ch" forName="txShp" refType="h" refFor="ch" refForName="imgShp" op="equ"/>
+              <dgm:constr type="ctrY" for="ch" forName="txShp" refType="h" fact="0.5"/>
+              <dgm:constr type="r" for="ch" forName="txShp" refType="ctrX" refFor="ch" refForName="imgShp"/>
+              <dgm:constr type="rMarg" for="ch" forName="txShp" refType="w" refFor="ch" refForName="imgShp" fact="1.25"/>
+            </dgm:constrLst>
+          </dgm:else>
+        </dgm:choose>
+        <dgm:ruleLst/>
+        <dgm:layoutNode name="imgShp" styleLbl="fgImgPlace1">
+          <dgm:alg type="sp"/>
+          <dgm:shape xmlns:r="http://schemas.openxmlformats.org/officeDocument/2006/relationships" type="ellipse" r:blip="" blipPhldr="1">
+            <dgm:adjLst/>
+          </dgm:shape>
+          <dgm:presOf/>
+          <dgm:constrLst/>
+          <dgm:ruleLst/>
+        </dgm:layoutNode>
+        <dgm:layoutNode name="txShp">
+          <dgm:varLst>
+            <dgm:bulletEnabled val="1"/>
+          </dgm:varLst>
+          <dgm:alg type="tx"/>
+          <dgm:choose name="Name4">
+            <dgm:if name="Name5" func="var" arg="dir" op="equ" val="norm">
+              <dgm:shape xmlns:r="http://schemas.openxmlformats.org/officeDocument/2006/relationships" rot="180" type="homePlate" r:blip="" zOrderOff="-1">
+                <dgm:adjLst/>
+              </dgm:shape>
+            </dgm:if>
+            <dgm:else name="Name6">
+              <dgm:shape xmlns:r="http://schemas.openxmlformats.org/officeDocument/2006/relationships" type="homePlate" r:blip="" zOrderOff="-1">
+                <dgm:adjLst/>
+              </dgm:shape>
+            </dgm:else>
+          </dgm:choose>
+          <dgm:presOf axis="desOrSelf" ptType="node"/>
+          <dgm:constrLst>
+            <dgm:constr type="tMarg" refType="primFontSz" fact="0.3"/>
+            <dgm:constr type="bMarg" refType="primFontSz" fact="0.3"/>
+          </dgm:constrLst>
+          <dgm:ruleLst>
+            <dgm:rule type="primFontSz" val="5" fact="NaN" max="NaN"/>
+          </dgm:ruleLst>
+        </dgm:layoutNode>
+      </dgm:layoutNode>
+      <dgm:forEach name="Name7" axis="followSib" ptType="sibTrans" cnt="1">
+        <dgm:layoutNode name="spacing">
+          <dgm:alg type="sp"/>
+          <dgm:shape xmlns:r="http://schemas.openxmlformats.org/officeDocument/2006/relationships" r:blip="">
+            <dgm:adjLst/>
+          </dgm:shape>
+          <dgm:presOf axis="self"/>
+          <dgm:constrLst/>
+          <dgm:ruleLst/>
+        </dgm:layoutNode>
+      </dgm:forEach>
+    </dgm:forEach>
+  </dgm:layoutNode>
+</dgm:layoutDef>
+</file>
+
 <file path=ppt/diagrams/quickStyle1.xml><?xml version="1.0" encoding="utf-8"?>
 <dgm:styleDef xmlns:dgm="http://schemas.openxmlformats.org/drawingml/2006/diagram" xmlns:a="http://schemas.openxmlformats.org/drawingml/2006/main" uniqueId="urn:microsoft.com/office/officeart/2005/8/quickstyle/simple4">
   <dgm:title val=""/>
@@ -6592,6 +7545,1040 @@
 </file>
 
 <file path=ppt/diagrams/quickStyle2.xml><?xml version="1.0" encoding="utf-8"?>
+<dgm:styleDef xmlns:dgm="http://schemas.openxmlformats.org/drawingml/2006/diagram" xmlns:a="http://schemas.openxmlformats.org/drawingml/2006/main" uniqueId="urn:microsoft.com/office/officeart/2005/8/quickstyle/simple1">
+  <dgm:title val=""/>
+  <dgm:desc val=""/>
+  <dgm:catLst>
+    <dgm:cat type="simple" pri="10100"/>
+  </dgm:catLst>
+  <dgm:scene3d>
+    <a:camera prst="orthographicFront"/>
+    <a:lightRig rig="threePt" dir="t"/>
+  </dgm:scene3d>
+  <dgm:styleLbl name="node0">
+    <dgm:scene3d>
+      <a:camera prst="orthographicFront"/>
+      <a:lightRig rig="threePt" dir="t"/>
+    </dgm:scene3d>
+    <dgm:sp3d/>
+    <dgm:txPr/>
+    <dgm:style>
+      <a:lnRef idx="2">
+        <a:scrgbClr r="0" g="0" b="0"/>
+      </a:lnRef>
+      <a:fillRef idx="1">
+        <a:scrgbClr r="0" g="0" b="0"/>
+      </a:fillRef>
+      <a:effectRef idx="0">
+        <a:scrgbClr r="0" g="0" b="0"/>
+      </a:effectRef>
+      <a:fontRef idx="minor">
+        <a:schemeClr val="lt1"/>
+      </a:fontRef>
+    </dgm:style>
+  </dgm:styleLbl>
+  <dgm:styleLbl name="lnNode1">
+    <dgm:scene3d>
+      <a:camera prst="orthographicFront"/>
+      <a:lightRig rig="threePt" dir="t"/>
+    </dgm:scene3d>
+    <dgm:sp3d/>
+    <dgm:txPr/>
+    <dgm:style>
+      <a:lnRef idx="2">
+        <a:scrgbClr r="0" g="0" b="0"/>
+      </a:lnRef>
+      <a:fillRef idx="1">
+        <a:scrgbClr r="0" g="0" b="0"/>
+      </a:fillRef>
+      <a:effectRef idx="0">
+        <a:scrgbClr r="0" g="0" b="0"/>
+      </a:effectRef>
+      <a:fontRef idx="minor">
+        <a:schemeClr val="lt1"/>
+      </a:fontRef>
+    </dgm:style>
+  </dgm:styleLbl>
+  <dgm:styleLbl name="vennNode1">
+    <dgm:scene3d>
+      <a:camera prst="orthographicFront"/>
+      <a:lightRig rig="threePt" dir="t"/>
+    </dgm:scene3d>
+    <dgm:sp3d/>
+    <dgm:txPr/>
+    <dgm:style>
+      <a:lnRef idx="2">
+        <a:scrgbClr r="0" g="0" b="0"/>
+      </a:lnRef>
+      <a:fillRef idx="1">
+        <a:scrgbClr r="0" g="0" b="0"/>
+      </a:fillRef>
+      <a:effectRef idx="0">
+        <a:scrgbClr r="0" g="0" b="0"/>
+      </a:effectRef>
+      <a:fontRef idx="minor">
+        <a:schemeClr val="tx1"/>
+      </a:fontRef>
+    </dgm:style>
+  </dgm:styleLbl>
+  <dgm:styleLbl name="alignNode1">
+    <dgm:scene3d>
+      <a:camera prst="orthographicFront"/>
+      <a:lightRig rig="threePt" dir="t"/>
+    </dgm:scene3d>
+    <dgm:sp3d/>
+    <dgm:txPr/>
+    <dgm:style>
+      <a:lnRef idx="2">
+        <a:scrgbClr r="0" g="0" b="0"/>
+      </a:lnRef>
+      <a:fillRef idx="1">
+        <a:scrgbClr r="0" g="0" b="0"/>
+      </a:fillRef>
+      <a:effectRef idx="0">
+        <a:scrgbClr r="0" g="0" b="0"/>
+      </a:effectRef>
+      <a:fontRef idx="minor">
+        <a:schemeClr val="lt1"/>
+      </a:fontRef>
+    </dgm:style>
+  </dgm:styleLbl>
+  <dgm:styleLbl name="node1">
+    <dgm:scene3d>
+      <a:camera prst="orthographicFront"/>
+      <a:lightRig rig="threePt" dir="t"/>
+    </dgm:scene3d>
+    <dgm:sp3d/>
+    <dgm:txPr/>
+    <dgm:style>
+      <a:lnRef idx="2">
+        <a:scrgbClr r="0" g="0" b="0"/>
+      </a:lnRef>
+      <a:fillRef idx="1">
+        <a:scrgbClr r="0" g="0" b="0"/>
+      </a:fillRef>
+      <a:effectRef idx="0">
+        <a:scrgbClr r="0" g="0" b="0"/>
+      </a:effectRef>
+      <a:fontRef idx="minor">
+        <a:schemeClr val="lt1"/>
+      </a:fontRef>
+    </dgm:style>
+  </dgm:styleLbl>
+  <dgm:styleLbl name="node2">
+    <dgm:scene3d>
+      <a:camera prst="orthographicFront"/>
+      <a:lightRig rig="threePt" dir="t"/>
+    </dgm:scene3d>
+    <dgm:sp3d/>
+    <dgm:txPr/>
+    <dgm:style>
+      <a:lnRef idx="2">
+        <a:scrgbClr r="0" g="0" b="0"/>
+      </a:lnRef>
+      <a:fillRef idx="1">
+        <a:scrgbClr r="0" g="0" b="0"/>
+      </a:fillRef>
+      <a:effectRef idx="0">
+        <a:scrgbClr r="0" g="0" b="0"/>
+      </a:effectRef>
+      <a:fontRef idx="minor">
+        <a:schemeClr val="lt1"/>
+      </a:fontRef>
+    </dgm:style>
+  </dgm:styleLbl>
+  <dgm:styleLbl name="node3">
+    <dgm:scene3d>
+      <a:camera prst="orthographicFront"/>
+      <a:lightRig rig="threePt" dir="t"/>
+    </dgm:scene3d>
+    <dgm:sp3d/>
+    <dgm:txPr/>
+    <dgm:style>
+      <a:lnRef idx="2">
+        <a:scrgbClr r="0" g="0" b="0"/>
+      </a:lnRef>
+      <a:fillRef idx="1">
+        <a:scrgbClr r="0" g="0" b="0"/>
+      </a:fillRef>
+      <a:effectRef idx="0">
+        <a:scrgbClr r="0" g="0" b="0"/>
+      </a:effectRef>
+      <a:fontRef idx="minor">
+        <a:schemeClr val="lt1"/>
+      </a:fontRef>
+    </dgm:style>
+  </dgm:styleLbl>
+  <dgm:styleLbl name="node4">
+    <dgm:scene3d>
+      <a:camera prst="orthographicFront"/>
+      <a:lightRig rig="threePt" dir="t"/>
+    </dgm:scene3d>
+    <dgm:sp3d/>
+    <dgm:txPr/>
+    <dgm:style>
+      <a:lnRef idx="2">
+        <a:scrgbClr r="0" g="0" b="0"/>
+      </a:lnRef>
+      <a:fillRef idx="1">
+        <a:scrgbClr r="0" g="0" b="0"/>
+      </a:fillRef>
+      <a:effectRef idx="0">
+        <a:scrgbClr r="0" g="0" b="0"/>
+      </a:effectRef>
+      <a:fontRef idx="minor">
+        <a:schemeClr val="lt1"/>
+      </a:fontRef>
+    </dgm:style>
+  </dgm:styleLbl>
+  <dgm:styleLbl name="fgImgPlace1">
+    <dgm:scene3d>
+      <a:camera prst="orthographicFront"/>
+      <a:lightRig rig="threePt" dir="t"/>
+    </dgm:scene3d>
+    <dgm:sp3d/>
+    <dgm:txPr/>
+    <dgm:style>
+      <a:lnRef idx="2">
+        <a:scrgbClr r="0" g="0" b="0"/>
+      </a:lnRef>
+      <a:fillRef idx="1">
+        <a:scrgbClr r="0" g="0" b="0"/>
+      </a:fillRef>
+      <a:effectRef idx="0">
+        <a:scrgbClr r="0" g="0" b="0"/>
+      </a:effectRef>
+      <a:fontRef idx="minor"/>
+    </dgm:style>
+  </dgm:styleLbl>
+  <dgm:styleLbl name="alignImgPlace1">
+    <dgm:scene3d>
+      <a:camera prst="orthographicFront"/>
+      <a:lightRig rig="threePt" dir="t"/>
+    </dgm:scene3d>
+    <dgm:sp3d/>
+    <dgm:txPr/>
+    <dgm:style>
+      <a:lnRef idx="2">
+        <a:scrgbClr r="0" g="0" b="0"/>
+      </a:lnRef>
+      <a:fillRef idx="1">
+        <a:scrgbClr r="0" g="0" b="0"/>
+      </a:fillRef>
+      <a:effectRef idx="0">
+        <a:scrgbClr r="0" g="0" b="0"/>
+      </a:effectRef>
+      <a:fontRef idx="minor"/>
+    </dgm:style>
+  </dgm:styleLbl>
+  <dgm:styleLbl name="bgImgPlace1">
+    <dgm:scene3d>
+      <a:camera prst="orthographicFront"/>
+      <a:lightRig rig="threePt" dir="t"/>
+    </dgm:scene3d>
+    <dgm:sp3d/>
+    <dgm:txPr/>
+    <dgm:style>
+      <a:lnRef idx="2">
+        <a:scrgbClr r="0" g="0" b="0"/>
+      </a:lnRef>
+      <a:fillRef idx="1">
+        <a:scrgbClr r="0" g="0" b="0"/>
+      </a:fillRef>
+      <a:effectRef idx="0">
+        <a:scrgbClr r="0" g="0" b="0"/>
+      </a:effectRef>
+      <a:fontRef idx="minor"/>
+    </dgm:style>
+  </dgm:styleLbl>
+  <dgm:styleLbl name="sibTrans2D1">
+    <dgm:scene3d>
+      <a:camera prst="orthographicFront"/>
+      <a:lightRig rig="threePt" dir="t"/>
+    </dgm:scene3d>
+    <dgm:sp3d/>
+    <dgm:txPr/>
+    <dgm:style>
+      <a:lnRef idx="0">
+        <a:scrgbClr r="0" g="0" b="0"/>
+      </a:lnRef>
+      <a:fillRef idx="1">
+        <a:scrgbClr r="0" g="0" b="0"/>
+      </a:fillRef>
+      <a:effectRef idx="0">
+        <a:scrgbClr r="0" g="0" b="0"/>
+      </a:effectRef>
+      <a:fontRef idx="minor">
+        <a:schemeClr val="lt1"/>
+      </a:fontRef>
+    </dgm:style>
+  </dgm:styleLbl>
+  <dgm:styleLbl name="fgSibTrans2D1">
+    <dgm:scene3d>
+      <a:camera prst="orthographicFront"/>
+      <a:lightRig rig="threePt" dir="t"/>
+    </dgm:scene3d>
+    <dgm:sp3d/>
+    <dgm:txPr/>
+    <dgm:style>
+      <a:lnRef idx="0">
+        <a:scrgbClr r="0" g="0" b="0"/>
+      </a:lnRef>
+      <a:fillRef idx="1">
+        <a:scrgbClr r="0" g="0" b="0"/>
+      </a:fillRef>
+      <a:effectRef idx="0">
+        <a:scrgbClr r="0" g="0" b="0"/>
+      </a:effectRef>
+      <a:fontRef idx="minor">
+        <a:schemeClr val="lt1"/>
+      </a:fontRef>
+    </dgm:style>
+  </dgm:styleLbl>
+  <dgm:styleLbl name="bgSibTrans2D1">
+    <dgm:scene3d>
+      <a:camera prst="orthographicFront"/>
+      <a:lightRig rig="threePt" dir="t"/>
+    </dgm:scene3d>
+    <dgm:sp3d/>
+    <dgm:txPr/>
+    <dgm:style>
+      <a:lnRef idx="0">
+        <a:scrgbClr r="0" g="0" b="0"/>
+      </a:lnRef>
+      <a:fillRef idx="1">
+        <a:scrgbClr r="0" g="0" b="0"/>
+      </a:fillRef>
+      <a:effectRef idx="0">
+        <a:scrgbClr r="0" g="0" b="0"/>
+      </a:effectRef>
+      <a:fontRef idx="minor">
+        <a:schemeClr val="lt1"/>
+      </a:fontRef>
+    </dgm:style>
+  </dgm:styleLbl>
+  <dgm:styleLbl name="sibTrans1D1">
+    <dgm:scene3d>
+      <a:camera prst="orthographicFront"/>
+      <a:lightRig rig="threePt" dir="t"/>
+    </dgm:scene3d>
+    <dgm:sp3d/>
+    <dgm:txPr/>
+    <dgm:style>
+      <a:lnRef idx="1">
+        <a:scrgbClr r="0" g="0" b="0"/>
+      </a:lnRef>
+      <a:fillRef idx="0">
+        <a:scrgbClr r="0" g="0" b="0"/>
+      </a:fillRef>
+      <a:effectRef idx="0">
+        <a:scrgbClr r="0" g="0" b="0"/>
+      </a:effectRef>
+      <a:fontRef idx="minor"/>
+    </dgm:style>
+  </dgm:styleLbl>
+  <dgm:styleLbl name="callout">
+    <dgm:scene3d>
+      <a:camera prst="orthographicFront"/>
+      <a:lightRig rig="threePt" dir="t"/>
+    </dgm:scene3d>
+    <dgm:sp3d/>
+    <dgm:txPr/>
+    <dgm:style>
+      <a:lnRef idx="2">
+        <a:scrgbClr r="0" g="0" b="0"/>
+      </a:lnRef>
+      <a:fillRef idx="1">
+        <a:scrgbClr r="0" g="0" b="0"/>
+      </a:fillRef>
+      <a:effectRef idx="0">
+        <a:scrgbClr r="0" g="0" b="0"/>
+      </a:effectRef>
+      <a:fontRef idx="minor"/>
+    </dgm:style>
+  </dgm:styleLbl>
+  <dgm:styleLbl name="asst0">
+    <dgm:scene3d>
+      <a:camera prst="orthographicFront"/>
+      <a:lightRig rig="threePt" dir="t"/>
+    </dgm:scene3d>
+    <dgm:sp3d/>
+    <dgm:txPr/>
+    <dgm:style>
+      <a:lnRef idx="2">
+        <a:scrgbClr r="0" g="0" b="0"/>
+      </a:lnRef>
+      <a:fillRef idx="1">
+        <a:scrgbClr r="0" g="0" b="0"/>
+      </a:fillRef>
+      <a:effectRef idx="0">
+        <a:scrgbClr r="0" g="0" b="0"/>
+      </a:effectRef>
+      <a:fontRef idx="minor">
+        <a:schemeClr val="lt1"/>
+      </a:fontRef>
+    </dgm:style>
+  </dgm:styleLbl>
+  <dgm:styleLbl name="asst1">
+    <dgm:scene3d>
+      <a:camera prst="orthographicFront"/>
+      <a:lightRig rig="threePt" dir="t"/>
+    </dgm:scene3d>
+    <dgm:sp3d/>
+    <dgm:txPr/>
+    <dgm:style>
+      <a:lnRef idx="2">
+        <a:scrgbClr r="0" g="0" b="0"/>
+      </a:lnRef>
+      <a:fillRef idx="1">
+        <a:scrgbClr r="0" g="0" b="0"/>
+      </a:fillRef>
+      <a:effectRef idx="0">
+        <a:scrgbClr r="0" g="0" b="0"/>
+      </a:effectRef>
+      <a:fontRef idx="minor">
+        <a:schemeClr val="lt1"/>
+      </a:fontRef>
+    </dgm:style>
+  </dgm:styleLbl>
+  <dgm:styleLbl name="asst2">
+    <dgm:scene3d>
+      <a:camera prst="orthographicFront"/>
+      <a:lightRig rig="threePt" dir="t"/>
+    </dgm:scene3d>
+    <dgm:sp3d/>
+    <dgm:txPr/>
+    <dgm:style>
+      <a:lnRef idx="2">
+        <a:scrgbClr r="0" g="0" b="0"/>
+      </a:lnRef>
+      <a:fillRef idx="1">
+        <a:scrgbClr r="0" g="0" b="0"/>
+      </a:fillRef>
+      <a:effectRef idx="0">
+        <a:scrgbClr r="0" g="0" b="0"/>
+      </a:effectRef>
+      <a:fontRef idx="minor">
+        <a:schemeClr val="lt1"/>
+      </a:fontRef>
+    </dgm:style>
+  </dgm:styleLbl>
+  <dgm:styleLbl name="asst3">
+    <dgm:scene3d>
+      <a:camera prst="orthographicFront"/>
+      <a:lightRig rig="threePt" dir="t"/>
+    </dgm:scene3d>
+    <dgm:sp3d/>
+    <dgm:txPr/>
+    <dgm:style>
+      <a:lnRef idx="2">
+        <a:scrgbClr r="0" g="0" b="0"/>
+      </a:lnRef>
+      <a:fillRef idx="1">
+        <a:scrgbClr r="0" g="0" b="0"/>
+      </a:fillRef>
+      <a:effectRef idx="0">
+        <a:scrgbClr r="0" g="0" b="0"/>
+      </a:effectRef>
+      <a:fontRef idx="minor">
+        <a:schemeClr val="lt1"/>
+      </a:fontRef>
+    </dgm:style>
+  </dgm:styleLbl>
+  <dgm:styleLbl name="asst4">
+    <dgm:scene3d>
+      <a:camera prst="orthographicFront"/>
+      <a:lightRig rig="threePt" dir="t"/>
+    </dgm:scene3d>
+    <dgm:sp3d/>
+    <dgm:txPr/>
+    <dgm:style>
+      <a:lnRef idx="2">
+        <a:scrgbClr r="0" g="0" b="0"/>
+      </a:lnRef>
+      <a:fillRef idx="1">
+        <a:scrgbClr r="0" g="0" b="0"/>
+      </a:fillRef>
+      <a:effectRef idx="0">
+        <a:scrgbClr r="0" g="0" b="0"/>
+      </a:effectRef>
+      <a:fontRef idx="minor">
+        <a:schemeClr val="lt1"/>
+      </a:fontRef>
+    </dgm:style>
+  </dgm:styleLbl>
+  <dgm:styleLbl name="parChTrans2D1">
+    <dgm:scene3d>
+      <a:camera prst="orthographicFront"/>
+      <a:lightRig rig="threePt" dir="t"/>
+    </dgm:scene3d>
+    <dgm:sp3d/>
+    <dgm:txPr/>
+    <dgm:style>
+      <a:lnRef idx="2">
+        <a:scrgbClr r="0" g="0" b="0"/>
+      </a:lnRef>
+      <a:fillRef idx="1">
+        <a:scrgbClr r="0" g="0" b="0"/>
+      </a:fillRef>
+      <a:effectRef idx="0">
+        <a:scrgbClr r="0" g="0" b="0"/>
+      </a:effectRef>
+      <a:fontRef idx="minor">
+        <a:schemeClr val="lt1"/>
+      </a:fontRef>
+    </dgm:style>
+  </dgm:styleLbl>
+  <dgm:styleLbl name="parChTrans2D2">
+    <dgm:scene3d>
+      <a:camera prst="orthographicFront"/>
+      <a:lightRig rig="threePt" dir="t"/>
+    </dgm:scene3d>
+    <dgm:sp3d/>
+    <dgm:txPr/>
+    <dgm:style>
+      <a:lnRef idx="2">
+        <a:scrgbClr r="0" g="0" b="0"/>
+      </a:lnRef>
+      <a:fillRef idx="1">
+        <a:scrgbClr r="0" g="0" b="0"/>
+      </a:fillRef>
+      <a:effectRef idx="0">
+        <a:scrgbClr r="0" g="0" b="0"/>
+      </a:effectRef>
+      <a:fontRef idx="minor">
+        <a:schemeClr val="lt1"/>
+      </a:fontRef>
+    </dgm:style>
+  </dgm:styleLbl>
+  <dgm:styleLbl name="parChTrans2D3">
+    <dgm:scene3d>
+      <a:camera prst="orthographicFront"/>
+      <a:lightRig rig="threePt" dir="t"/>
+    </dgm:scene3d>
+    <dgm:sp3d/>
+    <dgm:txPr/>
+    <dgm:style>
+      <a:lnRef idx="2">
+        <a:scrgbClr r="0" g="0" b="0"/>
+      </a:lnRef>
+      <a:fillRef idx="1">
+        <a:scrgbClr r="0" g="0" b="0"/>
+      </a:fillRef>
+      <a:effectRef idx="0">
+        <a:scrgbClr r="0" g="0" b="0"/>
+      </a:effectRef>
+      <a:fontRef idx="minor">
+        <a:schemeClr val="lt1"/>
+      </a:fontRef>
+    </dgm:style>
+  </dgm:styleLbl>
+  <dgm:styleLbl name="parChTrans2D4">
+    <dgm:scene3d>
+      <a:camera prst="orthographicFront"/>
+      <a:lightRig rig="threePt" dir="t"/>
+    </dgm:scene3d>
+    <dgm:sp3d/>
+    <dgm:txPr/>
+    <dgm:style>
+      <a:lnRef idx="2">
+        <a:scrgbClr r="0" g="0" b="0"/>
+      </a:lnRef>
+      <a:fillRef idx="1">
+        <a:scrgbClr r="0" g="0" b="0"/>
+      </a:fillRef>
+      <a:effectRef idx="0">
+        <a:scrgbClr r="0" g="0" b="0"/>
+      </a:effectRef>
+      <a:fontRef idx="minor">
+        <a:schemeClr val="lt1"/>
+      </a:fontRef>
+    </dgm:style>
+  </dgm:styleLbl>
+  <dgm:styleLbl name="parChTrans1D1">
+    <dgm:scene3d>
+      <a:camera prst="orthographicFront"/>
+      <a:lightRig rig="threePt" dir="t"/>
+    </dgm:scene3d>
+    <dgm:sp3d/>
+    <dgm:txPr/>
+    <dgm:style>
+      <a:lnRef idx="2">
+        <a:scrgbClr r="0" g="0" b="0"/>
+      </a:lnRef>
+      <a:fillRef idx="0">
+        <a:scrgbClr r="0" g="0" b="0"/>
+      </a:fillRef>
+      <a:effectRef idx="0">
+        <a:scrgbClr r="0" g="0" b="0"/>
+      </a:effectRef>
+      <a:fontRef idx="minor"/>
+    </dgm:style>
+  </dgm:styleLbl>
+  <dgm:styleLbl name="parChTrans1D2">
+    <dgm:scene3d>
+      <a:camera prst="orthographicFront"/>
+      <a:lightRig rig="threePt" dir="t"/>
+    </dgm:scene3d>
+    <dgm:sp3d/>
+    <dgm:txPr/>
+    <dgm:style>
+      <a:lnRef idx="2">
+        <a:scrgbClr r="0" g="0" b="0"/>
+      </a:lnRef>
+      <a:fillRef idx="0">
+        <a:scrgbClr r="0" g="0" b="0"/>
+      </a:fillRef>
+      <a:effectRef idx="0">
+        <a:scrgbClr r="0" g="0" b="0"/>
+      </a:effectRef>
+      <a:fontRef idx="minor"/>
+    </dgm:style>
+  </dgm:styleLbl>
+  <dgm:styleLbl name="parChTrans1D3">
+    <dgm:scene3d>
+      <a:camera prst="orthographicFront"/>
+      <a:lightRig rig="threePt" dir="t"/>
+    </dgm:scene3d>
+    <dgm:sp3d/>
+    <dgm:txPr/>
+    <dgm:style>
+      <a:lnRef idx="2">
+        <a:scrgbClr r="0" g="0" b="0"/>
+      </a:lnRef>
+      <a:fillRef idx="0">
+        <a:scrgbClr r="0" g="0" b="0"/>
+      </a:fillRef>
+      <a:effectRef idx="0">
+        <a:scrgbClr r="0" g="0" b="0"/>
+      </a:effectRef>
+      <a:fontRef idx="minor"/>
+    </dgm:style>
+  </dgm:styleLbl>
+  <dgm:styleLbl name="parChTrans1D4">
+    <dgm:scene3d>
+      <a:camera prst="orthographicFront"/>
+      <a:lightRig rig="threePt" dir="t"/>
+    </dgm:scene3d>
+    <dgm:sp3d/>
+    <dgm:txPr/>
+    <dgm:style>
+      <a:lnRef idx="2">
+        <a:scrgbClr r="0" g="0" b="0"/>
+      </a:lnRef>
+      <a:fillRef idx="0">
+        <a:scrgbClr r="0" g="0" b="0"/>
+      </a:fillRef>
+      <a:effectRef idx="0">
+        <a:scrgbClr r="0" g="0" b="0"/>
+      </a:effectRef>
+      <a:fontRef idx="minor"/>
+    </dgm:style>
+  </dgm:styleLbl>
+  <dgm:styleLbl name="fgAcc1">
+    <dgm:scene3d>
+      <a:camera prst="orthographicFront"/>
+      <a:lightRig rig="threePt" dir="t"/>
+    </dgm:scene3d>
+    <dgm:sp3d/>
+    <dgm:txPr/>
+    <dgm:style>
+      <a:lnRef idx="2">
+        <a:scrgbClr r="0" g="0" b="0"/>
+      </a:lnRef>
+      <a:fillRef idx="1">
+        <a:scrgbClr r="0" g="0" b="0"/>
+      </a:fillRef>
+      <a:effectRef idx="0">
+        <a:scrgbClr r="0" g="0" b="0"/>
+      </a:effectRef>
+      <a:fontRef idx="minor"/>
+    </dgm:style>
+  </dgm:styleLbl>
+  <dgm:styleLbl name="conFgAcc1">
+    <dgm:scene3d>
+      <a:camera prst="orthographicFront"/>
+      <a:lightRig rig="threePt" dir="t"/>
+    </dgm:scene3d>
+    <dgm:sp3d/>
+    <dgm:txPr/>
+    <dgm:style>
+      <a:lnRef idx="2">
+        <a:scrgbClr r="0" g="0" b="0"/>
+      </a:lnRef>
+      <a:fillRef idx="1">
+        <a:scrgbClr r="0" g="0" b="0"/>
+      </a:fillRef>
+      <a:effectRef idx="0">
+        <a:scrgbClr r="0" g="0" b="0"/>
+      </a:effectRef>
+      <a:fontRef idx="minor"/>
+    </dgm:style>
+  </dgm:styleLbl>
+  <dgm:styleLbl name="alignAcc1">
+    <dgm:scene3d>
+      <a:camera prst="orthographicFront"/>
+      <a:lightRig rig="threePt" dir="t"/>
+    </dgm:scene3d>
+    <dgm:sp3d/>
+    <dgm:txPr/>
+    <dgm:style>
+      <a:lnRef idx="2">
+        <a:scrgbClr r="0" g="0" b="0"/>
+      </a:lnRef>
+      <a:fillRef idx="1">
+        <a:scrgbClr r="0" g="0" b="0"/>
+      </a:fillRef>
+      <a:effectRef idx="0">
+        <a:scrgbClr r="0" g="0" b="0"/>
+      </a:effectRef>
+      <a:fontRef idx="minor"/>
+    </dgm:style>
+  </dgm:styleLbl>
+  <dgm:styleLbl name="trAlignAcc1">
+    <dgm:scene3d>
+      <a:camera prst="orthographicFront"/>
+      <a:lightRig rig="threePt" dir="t"/>
+    </dgm:scene3d>
+    <dgm:sp3d/>
+    <dgm:txPr/>
+    <dgm:style>
+      <a:lnRef idx="1">
+        <a:scrgbClr r="0" g="0" b="0"/>
+      </a:lnRef>
+      <a:fillRef idx="1">
+        <a:scrgbClr r="0" g="0" b="0"/>
+      </a:fillRef>
+      <a:effectRef idx="0">
+        <a:scrgbClr r="0" g="0" b="0"/>
+      </a:effectRef>
+      <a:fontRef idx="minor"/>
+    </dgm:style>
+  </dgm:styleLbl>
+  <dgm:styleLbl name="bgAcc1">
+    <dgm:scene3d>
+      <a:camera prst="orthographicFront"/>
+      <a:lightRig rig="threePt" dir="t"/>
+    </dgm:scene3d>
+    <dgm:sp3d/>
+    <dgm:txPr/>
+    <dgm:style>
+      <a:lnRef idx="2">
+        <a:scrgbClr r="0" g="0" b="0"/>
+      </a:lnRef>
+      <a:fillRef idx="1">
+        <a:scrgbClr r="0" g="0" b="0"/>
+      </a:fillRef>
+      <a:effectRef idx="0">
+        <a:scrgbClr r="0" g="0" b="0"/>
+      </a:effectRef>
+      <a:fontRef idx="minor"/>
+    </dgm:style>
+  </dgm:styleLbl>
+  <dgm:styleLbl name="solidFgAcc1">
+    <dgm:scene3d>
+      <a:camera prst="orthographicFront"/>
+      <a:lightRig rig="threePt" dir="t"/>
+    </dgm:scene3d>
+    <dgm:sp3d/>
+    <dgm:txPr/>
+    <dgm:style>
+      <a:lnRef idx="2">
+        <a:scrgbClr r="0" g="0" b="0"/>
+      </a:lnRef>
+      <a:fillRef idx="1">
+        <a:scrgbClr r="0" g="0" b="0"/>
+      </a:fillRef>
+      <a:effectRef idx="0">
+        <a:scrgbClr r="0" g="0" b="0"/>
+      </a:effectRef>
+      <a:fontRef idx="minor"/>
+    </dgm:style>
+  </dgm:styleLbl>
+  <dgm:styleLbl name="solidAlignAcc1">
+    <dgm:scene3d>
+      <a:camera prst="orthographicFront"/>
+      <a:lightRig rig="threePt" dir="t"/>
+    </dgm:scene3d>
+    <dgm:sp3d/>
+    <dgm:txPr/>
+    <dgm:style>
+      <a:lnRef idx="2">
+        <a:scrgbClr r="0" g="0" b="0"/>
+      </a:lnRef>
+      <a:fillRef idx="1">
+        <a:scrgbClr r="0" g="0" b="0"/>
+      </a:fillRef>
+      <a:effectRef idx="0">
+        <a:scrgbClr r="0" g="0" b="0"/>
+      </a:effectRef>
+      <a:fontRef idx="minor"/>
+    </dgm:style>
+  </dgm:styleLbl>
+  <dgm:styleLbl name="solidBgAcc1">
+    <dgm:scene3d>
+      <a:camera prst="orthographicFront"/>
+      <a:lightRig rig="threePt" dir="t"/>
+    </dgm:scene3d>
+    <dgm:sp3d/>
+    <dgm:txPr/>
+    <dgm:style>
+      <a:lnRef idx="2">
+        <a:scrgbClr r="0" g="0" b="0"/>
+      </a:lnRef>
+      <a:fillRef idx="1">
+        <a:scrgbClr r="0" g="0" b="0"/>
+      </a:fillRef>
+      <a:effectRef idx="0">
+        <a:scrgbClr r="0" g="0" b="0"/>
+      </a:effectRef>
+      <a:fontRef idx="minor"/>
+    </dgm:style>
+  </dgm:styleLbl>
+  <dgm:styleLbl name="fgAccFollowNode1">
+    <dgm:scene3d>
+      <a:camera prst="orthographicFront"/>
+      <a:lightRig rig="threePt" dir="t"/>
+    </dgm:scene3d>
+    <dgm:sp3d/>
+    <dgm:txPr/>
+    <dgm:style>
+      <a:lnRef idx="2">
+        <a:scrgbClr r="0" g="0" b="0"/>
+      </a:lnRef>
+      <a:fillRef idx="1">
+        <a:scrgbClr r="0" g="0" b="0"/>
+      </a:fillRef>
+      <a:effectRef idx="0">
+        <a:scrgbClr r="0" g="0" b="0"/>
+      </a:effectRef>
+      <a:fontRef idx="minor"/>
+    </dgm:style>
+  </dgm:styleLbl>
+  <dgm:styleLbl name="alignAccFollowNode1">
+    <dgm:scene3d>
+      <a:camera prst="orthographicFront"/>
+      <a:lightRig rig="threePt" dir="t"/>
+    </dgm:scene3d>
+    <dgm:sp3d/>
+    <dgm:txPr/>
+    <dgm:style>
+      <a:lnRef idx="2">
+        <a:scrgbClr r="0" g="0" b="0"/>
+      </a:lnRef>
+      <a:fillRef idx="1">
+        <a:scrgbClr r="0" g="0" b="0"/>
+      </a:fillRef>
+      <a:effectRef idx="0">
+        <a:scrgbClr r="0" g="0" b="0"/>
+      </a:effectRef>
+      <a:fontRef idx="minor"/>
+    </dgm:style>
+  </dgm:styleLbl>
+  <dgm:styleLbl name="bgAccFollowNode1">
+    <dgm:scene3d>
+      <a:camera prst="orthographicFront"/>
+      <a:lightRig rig="threePt" dir="t"/>
+    </dgm:scene3d>
+    <dgm:sp3d/>
+    <dgm:txPr/>
+    <dgm:style>
+      <a:lnRef idx="2">
+        <a:scrgbClr r="0" g="0" b="0"/>
+      </a:lnRef>
+      <a:fillRef idx="1">
+        <a:scrgbClr r="0" g="0" b="0"/>
+      </a:fillRef>
+      <a:effectRef idx="0">
+        <a:scrgbClr r="0" g="0" b="0"/>
+      </a:effectRef>
+      <a:fontRef idx="minor"/>
+    </dgm:style>
+  </dgm:styleLbl>
+  <dgm:styleLbl name="fgAcc0">
+    <dgm:scene3d>
+      <a:camera prst="orthographicFront"/>
+      <a:lightRig rig="threePt" dir="t"/>
+    </dgm:scene3d>
+    <dgm:sp3d/>
+    <dgm:txPr/>
+    <dgm:style>
+      <a:lnRef idx="2">
+        <a:scrgbClr r="0" g="0" b="0"/>
+      </a:lnRef>
+      <a:fillRef idx="1">
+        <a:scrgbClr r="0" g="0" b="0"/>
+      </a:fillRef>
+      <a:effectRef idx="0">
+        <a:scrgbClr r="0" g="0" b="0"/>
+      </a:effectRef>
+      <a:fontRef idx="minor"/>
+    </dgm:style>
+  </dgm:styleLbl>
+  <dgm:styleLbl name="fgAcc2">
+    <dgm:scene3d>
+      <a:camera prst="orthographicFront"/>
+      <a:lightRig rig="threePt" dir="t"/>
+    </dgm:scene3d>
+    <dgm:sp3d/>
+    <dgm:txPr/>
+    <dgm:style>
+      <a:lnRef idx="2">
+        <a:scrgbClr r="0" g="0" b="0"/>
+      </a:lnRef>
+      <a:fillRef idx="1">
+        <a:scrgbClr r="0" g="0" b="0"/>
+      </a:fillRef>
+      <a:effectRef idx="0">
+        <a:scrgbClr r="0" g="0" b="0"/>
+      </a:effectRef>
+      <a:fontRef idx="minor"/>
+    </dgm:style>
+  </dgm:styleLbl>
+  <dgm:styleLbl name="fgAcc3">
+    <dgm:scene3d>
+      <a:camera prst="orthographicFront"/>
+      <a:lightRig rig="threePt" dir="t"/>
+    </dgm:scene3d>
+    <dgm:sp3d/>
+    <dgm:txPr/>
+    <dgm:style>
+      <a:lnRef idx="2">
+        <a:scrgbClr r="0" g="0" b="0"/>
+      </a:lnRef>
+      <a:fillRef idx="1">
+        <a:scrgbClr r="0" g="0" b="0"/>
+      </a:fillRef>
+      <a:effectRef idx="0">
+        <a:scrgbClr r="0" g="0" b="0"/>
+      </a:effectRef>
+      <a:fontRef idx="minor"/>
+    </dgm:style>
+  </dgm:styleLbl>
+  <dgm:styleLbl name="fgAcc4">
+    <dgm:scene3d>
+      <a:camera prst="orthographicFront"/>
+      <a:lightRig rig="threePt" dir="t"/>
+    </dgm:scene3d>
+    <dgm:sp3d/>
+    <dgm:txPr/>
+    <dgm:style>
+      <a:lnRef idx="2">
+        <a:scrgbClr r="0" g="0" b="0"/>
+      </a:lnRef>
+      <a:fillRef idx="1">
+        <a:scrgbClr r="0" g="0" b="0"/>
+      </a:fillRef>
+      <a:effectRef idx="0">
+        <a:scrgbClr r="0" g="0" b="0"/>
+      </a:effectRef>
+      <a:fontRef idx="minor"/>
+    </dgm:style>
+  </dgm:styleLbl>
+  <dgm:styleLbl name="bgShp">
+    <dgm:scene3d>
+      <a:camera prst="orthographicFront"/>
+      <a:lightRig rig="threePt" dir="t"/>
+    </dgm:scene3d>
+    <dgm:sp3d/>
+    <dgm:txPr/>
+    <dgm:style>
+      <a:lnRef idx="0">
+        <a:scrgbClr r="0" g="0" b="0"/>
+      </a:lnRef>
+      <a:fillRef idx="1">
+        <a:scrgbClr r="0" g="0" b="0"/>
+      </a:fillRef>
+      <a:effectRef idx="0">
+        <a:scrgbClr r="0" g="0" b="0"/>
+      </a:effectRef>
+      <a:fontRef idx="minor"/>
+    </dgm:style>
+  </dgm:styleLbl>
+  <dgm:styleLbl name="dkBgShp">
+    <dgm:scene3d>
+      <a:camera prst="orthographicFront"/>
+      <a:lightRig rig="threePt" dir="t"/>
+    </dgm:scene3d>
+    <dgm:sp3d/>
+    <dgm:txPr/>
+    <dgm:style>
+      <a:lnRef idx="0">
+        <a:scrgbClr r="0" g="0" b="0"/>
+      </a:lnRef>
+      <a:fillRef idx="1">
+        <a:scrgbClr r="0" g="0" b="0"/>
+      </a:fillRef>
+      <a:effectRef idx="0">
+        <a:scrgbClr r="0" g="0" b="0"/>
+      </a:effectRef>
+      <a:fontRef idx="minor"/>
+    </dgm:style>
+  </dgm:styleLbl>
+  <dgm:styleLbl name="trBgShp">
+    <dgm:scene3d>
+      <a:camera prst="orthographicFront"/>
+      <a:lightRig rig="threePt" dir="t"/>
+    </dgm:scene3d>
+    <dgm:sp3d/>
+    <dgm:txPr/>
+    <dgm:style>
+      <a:lnRef idx="0">
+        <a:scrgbClr r="0" g="0" b="0"/>
+      </a:lnRef>
+      <a:fillRef idx="1">
+        <a:scrgbClr r="0" g="0" b="0"/>
+      </a:fillRef>
+      <a:effectRef idx="0">
+        <a:scrgbClr r="0" g="0" b="0"/>
+      </a:effectRef>
+      <a:fontRef idx="minor"/>
+    </dgm:style>
+  </dgm:styleLbl>
+  <dgm:styleLbl name="fgShp">
+    <dgm:scene3d>
+      <a:camera prst="orthographicFront"/>
+      <a:lightRig rig="threePt" dir="t"/>
+    </dgm:scene3d>
+    <dgm:sp3d/>
+    <dgm:txPr/>
+    <dgm:style>
+      <a:lnRef idx="2">
+        <a:scrgbClr r="0" g="0" b="0"/>
+      </a:lnRef>
+      <a:fillRef idx="1">
+        <a:scrgbClr r="0" g="0" b="0"/>
+      </a:fillRef>
+      <a:effectRef idx="0">
+        <a:scrgbClr r="0" g="0" b="0"/>
+      </a:effectRef>
+      <a:fontRef idx="minor"/>
+    </dgm:style>
+  </dgm:styleLbl>
+  <dgm:styleLbl name="revTx">
+    <dgm:scene3d>
+      <a:camera prst="orthographicFront"/>
+      <a:lightRig rig="threePt" dir="t"/>
+    </dgm:scene3d>
+    <dgm:sp3d/>
+    <dgm:txPr/>
+    <dgm:style>
+      <a:lnRef idx="0">
+        <a:scrgbClr r="0" g="0" b="0"/>
+      </a:lnRef>
+      <a:fillRef idx="0">
+        <a:scrgbClr r="0" g="0" b="0"/>
+      </a:fillRef>
+      <a:effectRef idx="0">
+        <a:scrgbClr r="0" g="0" b="0"/>
+      </a:effectRef>
+      <a:fontRef idx="minor"/>
+    </dgm:style>
+  </dgm:styleLbl>
+</dgm:styleDef>
+</file>
+
+<file path=ppt/diagrams/quickStyle3.xml><?xml version="1.0" encoding="utf-8"?>
 <dgm:styleDef xmlns:dgm="http://schemas.openxmlformats.org/drawingml/2006/diagram" xmlns:a="http://schemas.openxmlformats.org/drawingml/2006/main" uniqueId="urn:microsoft.com/office/officeart/2005/8/quickstyle/simple1">
   <dgm:title val=""/>
   <dgm:desc val=""/>
@@ -7721,7 +9708,7 @@
             <a:pPr rtl="0"/>
             <a:fld id="{C62B80FE-187A-4085-BD71-F0873FF7BD68}" type="datetime1">
               <a:rPr lang="es-ES" smtClean="0"/>
-              <a:t>03/12/2023</a:t>
+              <a:t>05/12/2023</a:t>
             </a:fld>
             <a:endParaRPr lang="es-ES"/>
           </a:p>
@@ -7903,7 +9890,7 @@
             <a:pPr rtl="0"/>
             <a:fld id="{6D59A2BD-4571-4110-BB3E-5D004DE434FA}" type="datetime1">
               <a:rPr lang="es-ES" noProof="0" smtClean="0"/>
-              <a:t>03/12/2023</a:t>
+              <a:t>05/12/2023</a:t>
             </a:fld>
             <a:endParaRPr lang="es-ES" noProof="0"/>
           </a:p>
@@ -8413,7 +10400,7 @@
             <a:pPr rtl="0"/>
             <a:fld id="{C6B3AB32-59DF-41F1-9618-EDFBF5049629}" type="slidenum">
               <a:rPr lang="es-ES" smtClean="0"/>
-              <a:t>8</a:t>
+              <a:t>9</a:t>
             </a:fld>
             <a:endParaRPr lang="es-ES"/>
           </a:p>
@@ -8678,7 +10665,7 @@
             <a:pPr rtl="0"/>
             <a:fld id="{F409C0D2-15DE-4FAC-845B-C48979FFAEB9}" type="datetime1">
               <a:rPr lang="es-ES" noProof="0" smtClean="0"/>
-              <a:t>03/12/2023</a:t>
+              <a:t>05/12/2023</a:t>
             </a:fld>
             <a:endParaRPr lang="es-ES" noProof="0"/>
           </a:p>
@@ -8943,7 +10930,7 @@
             <a:pPr rtl="0"/>
             <a:fld id="{8CF9F163-DD03-4353-882E-CE0F9A80F1C3}" type="datetime1">
               <a:rPr lang="es-ES" noProof="0" smtClean="0"/>
-              <a:t>03/12/2023</a:t>
+              <a:t>05/12/2023</a:t>
             </a:fld>
             <a:endParaRPr lang="es-ES" noProof="0"/>
           </a:p>
@@ -9181,7 +11168,7 @@
             <a:pPr rtl="0"/>
             <a:fld id="{8D2FF54C-EA2F-453C-857C-5C9ADB86CB43}" type="datetime1">
               <a:rPr lang="es-ES" noProof="0" smtClean="0"/>
-              <a:t>03/12/2023</a:t>
+              <a:t>05/12/2023</a:t>
             </a:fld>
             <a:endParaRPr lang="es-ES" noProof="0"/>
           </a:p>
@@ -9424,7 +11411,7 @@
             <a:pPr rtl="0"/>
             <a:fld id="{57670FF6-52DC-429F-9C56-6A1BF295232E}" type="datetime1">
               <a:rPr lang="es-ES" noProof="0" smtClean="0"/>
-              <a:t>03/12/2023</a:t>
+              <a:t>05/12/2023</a:t>
             </a:fld>
             <a:endParaRPr lang="es-ES" noProof="0"/>
           </a:p>
@@ -9735,7 +11722,7 @@
             <a:pPr rtl="0"/>
             <a:fld id="{85E27922-51B6-4B96-9C28-2CD2060AE75A}" type="datetime1">
               <a:rPr lang="es-ES" noProof="0" smtClean="0"/>
-              <a:t>03/12/2023</a:t>
+              <a:t>05/12/2023</a:t>
             </a:fld>
             <a:endParaRPr lang="es-ES" noProof="0"/>
           </a:p>
@@ -10039,7 +12026,7 @@
             <a:pPr rtl="0"/>
             <a:fld id="{F3ECF5D1-1C98-40FD-9D65-EED7644802B9}" type="datetime1">
               <a:rPr lang="es-ES" noProof="0" smtClean="0"/>
-              <a:t>03/12/2023</a:t>
+              <a:t>05/12/2023</a:t>
             </a:fld>
             <a:endParaRPr lang="es-ES" noProof="0"/>
           </a:p>
@@ -10463,7 +12450,7 @@
             <a:pPr rtl="0"/>
             <a:fld id="{8556C746-EB55-4634-AD93-A9FF2473885C}" type="datetime1">
               <a:rPr lang="es-ES" noProof="0" smtClean="0"/>
-              <a:t>03/12/2023</a:t>
+              <a:t>05/12/2023</a:t>
             </a:fld>
             <a:endParaRPr lang="es-ES" noProof="0"/>
           </a:p>
@@ -10562,7 +12549,7 @@
             <a:pPr rtl="0"/>
             <a:fld id="{C9051F13-F75A-440F-BED7-E2004746A95F}" type="datetime1">
               <a:rPr lang="es-ES" noProof="0" smtClean="0"/>
-              <a:t>03/12/2023</a:t>
+              <a:t>05/12/2023</a:t>
             </a:fld>
             <a:endParaRPr lang="es-ES" noProof="0"/>
           </a:p>
@@ -10728,7 +12715,7 @@
             <a:pPr rtl="0"/>
             <a:fld id="{3D7A2E7D-666A-420B-9042-959E1D47E21D}" type="datetime1">
               <a:rPr lang="es-ES" noProof="0" smtClean="0"/>
-              <a:t>03/12/2023</a:t>
+              <a:t>05/12/2023</a:t>
             </a:fld>
             <a:endParaRPr lang="es-ES" noProof="0"/>
           </a:p>
@@ -11109,7 +13096,7 @@
             <a:pPr rtl="0"/>
             <a:fld id="{0403F12F-0E67-4CAB-8DFD-26DCD4A99D59}" type="datetime1">
               <a:rPr lang="es-ES" noProof="0" smtClean="0"/>
-              <a:t>03/12/2023</a:t>
+              <a:t>05/12/2023</a:t>
             </a:fld>
             <a:endParaRPr lang="es-ES" noProof="0"/>
           </a:p>
@@ -11402,7 +13389,7 @@
             <a:pPr rtl="0"/>
             <a:fld id="{9709DA8C-1A59-4B91-B9EA-509377CD0E23}" type="datetime1">
               <a:rPr lang="es-ES" noProof="0" smtClean="0"/>
-              <a:t>03/12/2023</a:t>
+              <a:t>05/12/2023</a:t>
             </a:fld>
             <a:endParaRPr lang="es-ES" noProof="0"/>
           </a:p>
@@ -11616,7 +13603,7 @@
             <a:pPr rtl="0"/>
             <a:fld id="{A3DF7BF2-42BB-439B-88AA-F60334FF1291}" type="datetime1">
               <a:rPr lang="es-ES" noProof="0" smtClean="0"/>
-              <a:t>03/12/2023</a:t>
+              <a:t>05/12/2023</a:t>
             </a:fld>
             <a:endParaRPr lang="es-ES" noProof="0"/>
           </a:p>
@@ -13494,6 +15481,328 @@
           <p:cNvPr id="2" name="Título 1">
             <a:extLst>
               <a:ext uri="{FF2B5EF4-FFF2-40B4-BE49-F238E27FC236}">
+                <a16:creationId xmlns:a16="http://schemas.microsoft.com/office/drawing/2014/main" id="{B568100E-43A4-D60E-A6A6-392D679BD0C5}"/>
+              </a:ext>
+            </a:extLst>
+          </p:cNvPr>
+          <p:cNvSpPr>
+            <a:spLocks noGrp="1"/>
+          </p:cNvSpPr>
+          <p:nvPr>
+            <p:ph type="title"/>
+          </p:nvPr>
+        </p:nvSpPr>
+        <p:spPr/>
+        <p:txBody>
+          <a:bodyPr/>
+          <a:lstStyle/>
+          <a:p>
+            <a:r>
+              <a:rPr lang="es-ES" dirty="0"/>
+              <a:t>Decisiones de diseño</a:t>
+            </a:r>
+          </a:p>
+        </p:txBody>
+      </p:sp>
+      <p:graphicFrame>
+        <p:nvGraphicFramePr>
+          <p:cNvPr id="4" name="Marcador de contenido 3">
+            <a:extLst>
+              <a:ext uri="{FF2B5EF4-FFF2-40B4-BE49-F238E27FC236}">
+                <a16:creationId xmlns:a16="http://schemas.microsoft.com/office/drawing/2014/main" id="{A5DDDE9E-901F-6112-D8AC-EF4B39C27F55}"/>
+              </a:ext>
+            </a:extLst>
+          </p:cNvPr>
+          <p:cNvGraphicFramePr>
+            <a:graphicFrameLocks noGrp="1"/>
+          </p:cNvGraphicFramePr>
+          <p:nvPr>
+            <p:ph idx="1"/>
+          </p:nvPr>
+        </p:nvGraphicFramePr>
+        <p:xfrm>
+          <a:off x="581192" y="2180496"/>
+          <a:ext cx="11029615" cy="3678303"/>
+        </p:xfrm>
+        <a:graphic>
+          <a:graphicData uri="http://schemas.openxmlformats.org/drawingml/2006/diagram">
+            <dgm:relIds xmlns:dgm="http://schemas.openxmlformats.org/drawingml/2006/diagram" xmlns:r="http://schemas.openxmlformats.org/officeDocument/2006/relationships" r:dm="rId2" r:lo="rId3" r:qs="rId4" r:cs="rId5"/>
+          </a:graphicData>
+        </a:graphic>
+      </p:graphicFrame>
+      <p:sp>
+        <p:nvSpPr>
+          <p:cNvPr id="5" name="CuadroTexto 4">
+            <a:extLst>
+              <a:ext uri="{FF2B5EF4-FFF2-40B4-BE49-F238E27FC236}">
+                <a16:creationId xmlns:a16="http://schemas.microsoft.com/office/drawing/2014/main" id="{E5FFC10F-009F-8922-5634-AD8AAC70A1C1}"/>
+              </a:ext>
+            </a:extLst>
+          </p:cNvPr>
+          <p:cNvSpPr txBox="1"/>
+          <p:nvPr/>
+        </p:nvSpPr>
+        <p:spPr>
+          <a:xfrm>
+            <a:off x="581192" y="1995938"/>
+            <a:ext cx="11029615" cy="6986528"/>
+          </a:xfrm>
+          <a:prstGeom prst="rect">
+            <a:avLst/>
+          </a:prstGeom>
+          <a:noFill/>
+        </p:spPr>
+        <p:txBody>
+          <a:bodyPr wrap="square" rtlCol="0">
+            <a:spAutoFit/>
+          </a:bodyPr>
+          <a:lstStyle/>
+          <a:p>
+            <a:pPr algn="just"/>
+            <a:endParaRPr lang="es-ES" sz="1400" dirty="0"/>
+          </a:p>
+          <a:p>
+            <a:pPr marL="285750" indent="-285750" algn="just">
+              <a:buFont typeface="Wingdings" panose="05000000000000000000" pitchFamily="2" charset="2"/>
+              <a:buChar char="Ø"/>
+            </a:pPr>
+            <a:r>
+              <a:rPr lang="es-ES" sz="1400" dirty="0"/>
+              <a:t>Se ha decidido que los barman devuelvan información específica de la bebida tal y como es la marca del producto (</a:t>
+            </a:r>
+            <a:r>
+              <a:rPr lang="es-ES" sz="1400" dirty="0" err="1"/>
+              <a:t>brand</a:t>
+            </a:r>
+            <a:r>
+              <a:rPr lang="es-ES" sz="1400" dirty="0"/>
+              <a:t>), la cantidad servida de producto (</a:t>
+            </a:r>
+            <a:r>
+              <a:rPr lang="es-ES" sz="1400" dirty="0" err="1"/>
+              <a:t>quantity_served</a:t>
+            </a:r>
+            <a:r>
+              <a:rPr lang="es-ES" sz="1400" dirty="0"/>
+              <a:t>) y el estilo de servicio (</a:t>
+            </a:r>
+            <a:r>
+              <a:rPr lang="es-ES" sz="1400" dirty="0" err="1"/>
+              <a:t>serving_style</a:t>
+            </a:r>
+            <a:r>
+              <a:rPr lang="es-ES" sz="1400" dirty="0"/>
+              <a:t>):</a:t>
+            </a:r>
+          </a:p>
+          <a:p>
+            <a:pPr marL="285750" indent="-285750" algn="just">
+              <a:buFont typeface="Wingdings" panose="05000000000000000000" pitchFamily="2" charset="2"/>
+              <a:buChar char="Ø"/>
+            </a:pPr>
+            <a:endParaRPr lang="es-ES" sz="1400" dirty="0"/>
+          </a:p>
+          <a:p>
+            <a:pPr algn="just"/>
+            <a:endParaRPr lang="es-ES" sz="1400" dirty="0"/>
+          </a:p>
+          <a:p>
+            <a:pPr marL="285750" indent="-285750" algn="just">
+              <a:buFont typeface="Wingdings" panose="05000000000000000000" pitchFamily="2" charset="2"/>
+              <a:buChar char="Ø"/>
+            </a:pPr>
+            <a:endParaRPr lang="es-ES" sz="1400" dirty="0"/>
+          </a:p>
+          <a:p>
+            <a:pPr marL="285750" indent="-285750" algn="just">
+              <a:buFont typeface="Wingdings" panose="05000000000000000000" pitchFamily="2" charset="2"/>
+              <a:buChar char="Ø"/>
+            </a:pPr>
+            <a:endParaRPr lang="es-ES" sz="1400" dirty="0"/>
+          </a:p>
+          <a:p>
+            <a:pPr marL="285750" indent="-285750" algn="just">
+              <a:buFont typeface="Wingdings" panose="05000000000000000000" pitchFamily="2" charset="2"/>
+              <a:buChar char="Ø"/>
+            </a:pPr>
+            <a:endParaRPr lang="es-ES" sz="1400" dirty="0"/>
+          </a:p>
+          <a:p>
+            <a:pPr marL="285750" indent="-285750" algn="just">
+              <a:buFont typeface="Wingdings" panose="05000000000000000000" pitchFamily="2" charset="2"/>
+              <a:buChar char="Ø"/>
+            </a:pPr>
+            <a:endParaRPr lang="es-ES" sz="1400" dirty="0"/>
+          </a:p>
+          <a:p>
+            <a:pPr algn="just"/>
+            <a:endParaRPr lang="es-ES" sz="1400" dirty="0"/>
+          </a:p>
+          <a:p>
+            <a:pPr marL="285750" indent="-285750" algn="just">
+              <a:buFont typeface="Wingdings" panose="05000000000000000000" pitchFamily="2" charset="2"/>
+              <a:buChar char="Ø"/>
+            </a:pPr>
+            <a:r>
+              <a:rPr lang="es-ES" sz="1400" dirty="0"/>
+              <a:t>En este caso, para la bebida café, se ha devuelto que debe ser de la marca </a:t>
+            </a:r>
+            <a:r>
+              <a:rPr lang="es-ES" sz="1400" dirty="0" err="1"/>
+              <a:t>Nescafé</a:t>
+            </a:r>
+            <a:r>
+              <a:rPr lang="es-ES" sz="1400" dirty="0"/>
+              <a:t>, en una cantidad de 150 ml y servido en una taza de café.</a:t>
+            </a:r>
+          </a:p>
+          <a:p>
+            <a:pPr marL="285750" indent="-285750" algn="just">
+              <a:buFont typeface="Wingdings" panose="05000000000000000000" pitchFamily="2" charset="2"/>
+              <a:buChar char="Ø"/>
+            </a:pPr>
+            <a:endParaRPr lang="es-ES" sz="1400" dirty="0"/>
+          </a:p>
+          <a:p>
+            <a:pPr marL="285750" indent="-285750" algn="just">
+              <a:buFont typeface="Wingdings" panose="05000000000000000000" pitchFamily="2" charset="2"/>
+              <a:buChar char="Ø"/>
+            </a:pPr>
+            <a:r>
+              <a:rPr lang="es-ES" sz="1400" dirty="0"/>
+              <a:t>En algunas tareas para conseguir un comportamiento personalizado se ha hecho uso de un criterio “</a:t>
+            </a:r>
+            <a:r>
+              <a:rPr lang="es-ES" sz="1400" dirty="0" err="1"/>
+              <a:t>XXXXCriteria</a:t>
+            </a:r>
+            <a:r>
+              <a:rPr lang="es-ES" sz="1400" dirty="0"/>
+              <a:t>” como por ejemplo en el caso del </a:t>
+            </a:r>
+            <a:r>
+              <a:rPr lang="es-ES" sz="1400" dirty="0" err="1"/>
+              <a:t>DistributorTask</a:t>
+            </a:r>
+            <a:r>
+              <a:rPr lang="es-ES" sz="1400"/>
+              <a:t>.</a:t>
+            </a:r>
+            <a:endParaRPr lang="es-ES" sz="1400" dirty="0"/>
+          </a:p>
+          <a:p>
+            <a:pPr marL="285750" indent="-285750" algn="just">
+              <a:buFont typeface="Wingdings" panose="05000000000000000000" pitchFamily="2" charset="2"/>
+              <a:buChar char="Ø"/>
+            </a:pPr>
+            <a:endParaRPr lang="es-ES" dirty="0"/>
+          </a:p>
+          <a:p>
+            <a:endParaRPr lang="es-ES" dirty="0"/>
+          </a:p>
+          <a:p>
+            <a:endParaRPr lang="es-ES" dirty="0"/>
+          </a:p>
+          <a:p>
+            <a:endParaRPr lang="es-ES" dirty="0"/>
+          </a:p>
+          <a:p>
+            <a:endParaRPr lang="es-ES" dirty="0"/>
+          </a:p>
+          <a:p>
+            <a:endParaRPr lang="es-ES" dirty="0"/>
+          </a:p>
+          <a:p>
+            <a:endParaRPr lang="es-ES" dirty="0"/>
+          </a:p>
+          <a:p>
+            <a:endParaRPr lang="es-ES" dirty="0"/>
+          </a:p>
+          <a:p>
+            <a:endParaRPr lang="es-ES" dirty="0"/>
+          </a:p>
+          <a:p>
+            <a:endParaRPr lang="es-ES" dirty="0"/>
+          </a:p>
+          <a:p>
+            <a:endParaRPr lang="es-ES" dirty="0"/>
+          </a:p>
+          <a:p>
+            <a:endParaRPr lang="es-ES" dirty="0"/>
+          </a:p>
+          <a:p>
+            <a:endParaRPr lang="es-ES" dirty="0"/>
+          </a:p>
+          <a:p>
+            <a:endParaRPr lang="es-ES" dirty="0"/>
+          </a:p>
+        </p:txBody>
+      </p:sp>
+      <p:pic>
+        <p:nvPicPr>
+          <p:cNvPr id="6" name="Imagen 5">
+            <a:extLst>
+              <a:ext uri="{FF2B5EF4-FFF2-40B4-BE49-F238E27FC236}">
+                <a16:creationId xmlns:a16="http://schemas.microsoft.com/office/drawing/2014/main" id="{ABF0E1A6-C235-468A-6D11-5521C4B581CF}"/>
+              </a:ext>
+            </a:extLst>
+          </p:cNvPr>
+          <p:cNvPicPr>
+            <a:picLocks noChangeAspect="1"/>
+          </p:cNvPicPr>
+          <p:nvPr/>
+        </p:nvPicPr>
+        <p:blipFill>
+          <a:blip r:embed="rId7"/>
+          <a:stretch>
+            <a:fillRect/>
+          </a:stretch>
+        </p:blipFill>
+        <p:spPr>
+          <a:xfrm>
+            <a:off x="4243386" y="3019425"/>
+            <a:ext cx="3705225" cy="819150"/>
+          </a:xfrm>
+          <a:prstGeom prst="rect">
+            <a:avLst/>
+          </a:prstGeom>
+        </p:spPr>
+      </p:pic>
+    </p:spTree>
+    <p:extLst>
+      <p:ext uri="{BB962C8B-B14F-4D97-AF65-F5344CB8AC3E}">
+        <p14:creationId xmlns:p14="http://schemas.microsoft.com/office/powerpoint/2010/main" val="1713628535"/>
+      </p:ext>
+    </p:extLst>
+  </p:cSld>
+  <p:clrMapOvr>
+    <a:masterClrMapping/>
+  </p:clrMapOvr>
+</p:sld>
+</file>
+
+<file path=ppt/slides/slide5.xml><?xml version="1.0" encoding="utf-8"?>
+<p:sld xmlns:a="http://schemas.openxmlformats.org/drawingml/2006/main" xmlns:r="http://schemas.openxmlformats.org/officeDocument/2006/relationships" xmlns:p="http://schemas.openxmlformats.org/presentationml/2006/main">
+  <p:cSld>
+    <p:spTree>
+      <p:nvGrpSpPr>
+        <p:cNvPr id="1" name=""/>
+        <p:cNvGrpSpPr/>
+        <p:nvPr/>
+      </p:nvGrpSpPr>
+      <p:grpSpPr>
+        <a:xfrm>
+          <a:off x="0" y="0"/>
+          <a:ext cx="0" cy="0"/>
+          <a:chOff x="0" y="0"/>
+          <a:chExt cx="0" cy="0"/>
+        </a:xfrm>
+      </p:grpSpPr>
+      <p:sp>
+        <p:nvSpPr>
+          <p:cNvPr id="2" name="Título 1">
+            <a:extLst>
+              <a:ext uri="{FF2B5EF4-FFF2-40B4-BE49-F238E27FC236}">
                 <a16:creationId xmlns:a16="http://schemas.microsoft.com/office/drawing/2014/main" id="{B8F3C414-0810-99CA-EE65-8781DF3852A8}"/>
               </a:ext>
             </a:extLst>
@@ -13944,7 +16253,7 @@
 </p:sld>
 </file>
 
-<file path=ppt/slides/slide5.xml><?xml version="1.0" encoding="utf-8"?>
+<file path=ppt/slides/slide6.xml><?xml version="1.0" encoding="utf-8"?>
 <p:sld xmlns:a="http://schemas.openxmlformats.org/drawingml/2006/main" xmlns:r="http://schemas.openxmlformats.org/officeDocument/2006/relationships" xmlns:p="http://schemas.openxmlformats.org/presentationml/2006/main">
   <p:cSld>
     <p:spTree>
@@ -14376,7 +16685,7 @@
 </p:sld>
 </file>
 
-<file path=ppt/slides/slide6.xml><?xml version="1.0" encoding="utf-8"?>
+<file path=ppt/slides/slide7.xml><?xml version="1.0" encoding="utf-8"?>
 <p:sld xmlns:a="http://schemas.openxmlformats.org/drawingml/2006/main" xmlns:r="http://schemas.openxmlformats.org/officeDocument/2006/relationships" xmlns:p="http://schemas.openxmlformats.org/presentationml/2006/main">
   <p:cSld>
     <p:spTree>
@@ -14465,7 +16774,7 @@
 </p:sld>
 </file>
 
-<file path=ppt/slides/slide7.xml><?xml version="1.0" encoding="utf-8"?>
+<file path=ppt/slides/slide8.xml><?xml version="1.0" encoding="utf-8"?>
 <p:sld xmlns:a="http://schemas.openxmlformats.org/drawingml/2006/main" xmlns:r="http://schemas.openxmlformats.org/officeDocument/2006/relationships" xmlns:p="http://schemas.openxmlformats.org/presentationml/2006/main">
   <p:cSld>
     <p:spTree>
@@ -14554,7 +16863,7 @@
 </p:sld>
 </file>
 
-<file path=ppt/slides/slide8.xml><?xml version="1.0" encoding="utf-8"?>
+<file path=ppt/slides/slide9.xml><?xml version="1.0" encoding="utf-8"?>
 <p:sld xmlns:a="http://schemas.openxmlformats.org/drawingml/2006/main" xmlns:r="http://schemas.openxmlformats.org/officeDocument/2006/relationships" xmlns:p="http://schemas.openxmlformats.org/presentationml/2006/main">
   <p:cSld>
     <p:bg>

</xml_diff>